<commit_message>
Weiter am Vortrag gearbeitet
</commit_message>
<xml_diff>
--- a/Dokumente/SWT-Vortrag/SWTStudentenVortrag.pptx
+++ b/Dokumente/SWT-Vortrag/SWTStudentenVortrag.pptx
@@ -6,11 +6,14 @@
   </p:sldMasterIdLst>
   <p:sldIdLst>
     <p:sldId id="256" r:id="rId2"/>
-    <p:sldId id="259" r:id="rId3"/>
-    <p:sldId id="257" r:id="rId4"/>
-    <p:sldId id="258" r:id="rId5"/>
-    <p:sldId id="260" r:id="rId6"/>
-    <p:sldId id="261" r:id="rId7"/>
+    <p:sldId id="260" r:id="rId3"/>
+    <p:sldId id="261" r:id="rId4"/>
+    <p:sldId id="263" r:id="rId5"/>
+    <p:sldId id="259" r:id="rId6"/>
+    <p:sldId id="257" r:id="rId7"/>
+    <p:sldId id="264" r:id="rId8"/>
+    <p:sldId id="258" r:id="rId9"/>
+    <p:sldId id="262" r:id="rId10"/>
   </p:sldIdLst>
   <p:sldSz cx="9144000" cy="6858000" type="screen4x3"/>
   <p:notesSz cx="6858000" cy="9144000"/>
@@ -3719,7 +3722,7 @@
           <a:p>
             <a:r>
               <a:rPr lang="de-DE" dirty="0" smtClean="0"/>
-              <a:t>Im Projekt</a:t>
+              <a:t>In der Vorlesung</a:t>
             </a:r>
             <a:endParaRPr lang="de-DE" dirty="0"/>
           </a:p>
@@ -3740,7 +3743,7 @@
           <a:bodyPr/>
           <a:lstStyle/>
           <a:p>
-            <a:endParaRPr lang="de-DE" dirty="0"/>
+            <a:endParaRPr lang="de-DE"/>
           </a:p>
         </p:txBody>
       </p:sp>
@@ -3771,7 +3774,7 @@
       </p:grpSpPr>
       <p:sp>
         <p:nvSpPr>
-          <p:cNvPr id="2" name="Title 1"/>
+          <p:cNvPr id="4" name="Title 3"/>
           <p:cNvSpPr>
             <a:spLocks noGrp="1"/>
           </p:cNvSpPr>
@@ -3786,7 +3789,7 @@
           <a:p>
             <a:r>
               <a:rPr lang="de-DE" dirty="0" smtClean="0"/>
-              <a:t>Neue Werkzeuge und Technologien</a:t>
+              <a:t>Nützliche Erkenntnisse</a:t>
             </a:r>
             <a:endParaRPr lang="de-DE" dirty="0"/>
           </a:p>
@@ -3794,7 +3797,7 @@
       </p:sp>
       <p:sp>
         <p:nvSpPr>
-          <p:cNvPr id="3" name="Content Placeholder 2"/>
+          <p:cNvPr id="5" name="Content Placeholder 4"/>
           <p:cNvSpPr>
             <a:spLocks noGrp="1"/>
           </p:cNvSpPr>
@@ -3802,65 +3805,44 @@
             <p:ph idx="1"/>
           </p:nvPr>
         </p:nvSpPr>
-        <p:spPr>
-          <a:xfrm>
-            <a:off x="549275" y="1444532"/>
-            <a:ext cx="8042276" cy="5134825"/>
-          </a:xfrm>
-        </p:spPr>
+        <p:spPr/>
         <p:txBody>
           <a:bodyPr>
-            <a:normAutofit/>
+            <a:normAutofit lnSpcReduction="10000"/>
           </a:bodyPr>
           <a:lstStyle/>
-          <a:p>
-            <a:pPr>
-              <a:buNone/>
-            </a:pPr>
-            <a:r>
-              <a:rPr lang="de-DE" dirty="0" smtClean="0"/>
-              <a:t>- 	</a:t>
-            </a:r>
-            <a:r>
-              <a:rPr lang="de-DE" dirty="0" err="1" smtClean="0"/>
-              <a:t>Hibernate</a:t>
-            </a:r>
-            <a:r>
-              <a:rPr lang="de-DE" dirty="0" smtClean="0"/>
-              <a:t> zum Übertragen und Verwalten unser Datenklassen in eine relationale Datenbank</a:t>
-            </a:r>
-          </a:p>
-          <a:p>
-            <a:pPr>
-              <a:buNone/>
-            </a:pPr>
-            <a:r>
-              <a:rPr lang="de-DE" dirty="0" smtClean="0"/>
-              <a:t>-	H2 die verwendete relationale Datenbank für die Persistenz der, vom Nutzer eingetragene, Information</a:t>
-            </a:r>
-          </a:p>
-          <a:p>
-            <a:pPr>
-              <a:buNone/>
-            </a:pPr>
-            <a:r>
-              <a:rPr lang="de-DE" dirty="0" smtClean="0"/>
-              <a:t>- 	CSS um unserem Programm ein individuelleres Aussehen zu verleihen</a:t>
-            </a:r>
-          </a:p>
           <a:p>
             <a:pPr>
               <a:buFontTx/>
               <a:buChar char="-"/>
             </a:pPr>
             <a:r>
+              <a:rPr lang="de-DE" dirty="0" smtClean="0"/>
+              <a:t>D</a:t>
+            </a:r>
+            <a:r>
+              <a:rPr lang="de-DE" dirty="0" smtClean="0"/>
+              <a:t>as </a:t>
+            </a:r>
+            <a:r>
+              <a:rPr lang="de-DE" dirty="0" smtClean="0"/>
+              <a:t>A</a:t>
+            </a:r>
+            <a:r>
+              <a:rPr lang="de-DE" dirty="0" smtClean="0"/>
+              <a:t>rbeiten mit einem Versionsmanagement Programms</a:t>
+            </a:r>
+          </a:p>
+          <a:p>
+            <a:pPr lvl="1">
+              <a:buFontTx/>
+              <a:buChar char="-"/>
+            </a:pPr>
+            <a:r>
               <a:rPr lang="de-DE" dirty="0" err="1" smtClean="0"/>
-              <a:t>JavaFX</a:t>
-            </a:r>
-            <a:r>
-              <a:rPr lang="de-DE" dirty="0" smtClean="0"/>
-              <a:t> um die Benutzeroberfläche zu verwalten</a:t>
-            </a:r>
+              <a:t>Git</a:t>
+            </a:r>
+            <a:endParaRPr lang="de-DE" dirty="0" smtClean="0"/>
           </a:p>
           <a:p>
             <a:pPr>
@@ -3868,12 +3850,8 @@
               <a:buChar char="-"/>
             </a:pPr>
             <a:r>
-              <a:rPr lang="de-DE" dirty="0" err="1" smtClean="0"/>
-              <a:t>Scenebuilder</a:t>
-            </a:r>
-            <a:r>
               <a:rPr lang="de-DE" dirty="0" smtClean="0"/>
-              <a:t> um das Erstellen der Benutzeroberfläche durch visuelle Elemente zu vereinfachen</a:t>
+              <a:t>Einen strukturierten Verlauf des Entwickelns.</a:t>
             </a:r>
           </a:p>
           <a:p>
@@ -3881,12 +3859,30 @@
               <a:buFontTx/>
               <a:buChar char="-"/>
             </a:pPr>
-            <a:endParaRPr lang="de-DE" dirty="0" smtClean="0"/>
+            <a:r>
+              <a:rPr lang="de-DE" dirty="0" smtClean="0"/>
+              <a:t>Die unterschiedliche Arten der Entwickelung eines Programms</a:t>
+            </a:r>
           </a:p>
           <a:p>
             <a:pPr>
-              <a:buNone/>
+              <a:buFontTx/>
+              <a:buChar char="-"/>
             </a:pPr>
+            <a:r>
+              <a:rPr lang="de-DE" dirty="0" smtClean="0"/>
+              <a:t>Die Notwendigkeit von frühem Testen</a:t>
+            </a:r>
+          </a:p>
+          <a:p>
+            <a:pPr>
+              <a:buFontTx/>
+              <a:buChar char="-"/>
+            </a:pPr>
+            <a:r>
+              <a:rPr lang="de-DE" dirty="0" smtClean="0"/>
+              <a:t>Diverse Schemata für das Ausarbeiten eines Programmkonzeptes</a:t>
+            </a:r>
             <a:endParaRPr lang="de-DE" dirty="0"/>
           </a:p>
         </p:txBody>
@@ -3933,7 +3929,7 @@
           <a:p>
             <a:r>
               <a:rPr lang="de-DE" dirty="0" smtClean="0"/>
-              <a:t>Erfahrungen</a:t>
+              <a:t>Hilfreiche Techniken</a:t>
             </a:r>
             <a:endParaRPr lang="de-DE" dirty="0"/>
           </a:p>
@@ -3951,9 +3947,7 @@
         </p:nvSpPr>
         <p:spPr/>
         <p:txBody>
-          <a:bodyPr>
-            <a:normAutofit/>
-          </a:bodyPr>
+          <a:bodyPr/>
           <a:lstStyle/>
           <a:p>
             <a:pPr>
@@ -3962,11 +3956,21 @@
             </a:pPr>
             <a:r>
               <a:rPr lang="de-DE" dirty="0" smtClean="0"/>
-              <a:t>G</a:t>
+              <a:t>Test orientiertes Programmieren (TDD)</a:t>
+            </a:r>
+          </a:p>
+          <a:p>
+            <a:pPr lvl="1">
+              <a:buFontTx/>
+              <a:buChar char="-"/>
+            </a:pPr>
+            <a:r>
+              <a:rPr lang="de-DE" dirty="0" err="1" smtClean="0"/>
+              <a:t>JUnit</a:t>
             </a:r>
             <a:r>
               <a:rPr lang="de-DE" dirty="0" smtClean="0"/>
-              <a:t>ute Stimmung sehr wichtig ist für produktives Arbeiten</a:t>
+              <a:t> 4 </a:t>
             </a:r>
           </a:p>
           <a:p>
@@ -3975,9 +3979,10 @@
               <a:buChar char="-"/>
             </a:pPr>
             <a:r>
-              <a:rPr lang="de-DE" dirty="0" smtClean="0"/>
-              <a:t>Mehr kann geschafft werden als man erwartet, wenn man gut geplant arbeitet</a:t>
-            </a:r>
+              <a:rPr lang="de-DE" dirty="0" err="1" smtClean="0"/>
+              <a:t>Pair-Programming</a:t>
+            </a:r>
+            <a:endParaRPr lang="de-DE" dirty="0" smtClean="0"/>
           </a:p>
           <a:p>
             <a:pPr>
@@ -3986,7 +3991,23 @@
             </a:pPr>
             <a:r>
               <a:rPr lang="de-DE" dirty="0" smtClean="0"/>
-              <a:t>Prioritäten setzen und diesen folgen.</a:t>
+              <a:t>Projekt in </a:t>
+            </a:r>
+            <a:r>
+              <a:rPr lang="de-DE" dirty="0" err="1" smtClean="0"/>
+              <a:t>Stories</a:t>
+            </a:r>
+            <a:r>
+              <a:rPr lang="de-DE" dirty="0" smtClean="0"/>
+              <a:t> und </a:t>
+            </a:r>
+            <a:r>
+              <a:rPr lang="de-DE" dirty="0" err="1" smtClean="0"/>
+              <a:t>Tasks</a:t>
+            </a:r>
+            <a:r>
+              <a:rPr lang="de-DE" dirty="0" smtClean="0"/>
+              <a:t> unterteilen</a:t>
             </a:r>
           </a:p>
           <a:p>
@@ -3994,20 +4015,14 @@
               <a:buFontTx/>
               <a:buChar char="-"/>
             </a:pPr>
-            <a:r>
-              <a:rPr lang="de-DE" dirty="0" smtClean="0"/>
-              <a:t>Wissen wann etwas weniger wichtige beiseite fallen muss</a:t>
-            </a:r>
+            <a:endParaRPr lang="de-DE" dirty="0" smtClean="0"/>
           </a:p>
           <a:p>
             <a:pPr>
               <a:buFontTx/>
               <a:buChar char="-"/>
             </a:pPr>
-            <a:r>
-              <a:rPr lang="de-DE" dirty="0" smtClean="0"/>
-              <a:t>Feedback vom Kunde ist wertvoll</a:t>
-            </a:r>
+            <a:endParaRPr lang="de-DE" dirty="0"/>
           </a:p>
         </p:txBody>
       </p:sp>
@@ -4053,7 +4068,7 @@
           <a:p>
             <a:r>
               <a:rPr lang="de-DE" dirty="0" smtClean="0"/>
-              <a:t>In der Vorlesung</a:t>
+              <a:t>Im Projekt</a:t>
             </a:r>
             <a:endParaRPr lang="de-DE" dirty="0"/>
           </a:p>
@@ -4074,7 +4089,7 @@
           <a:bodyPr/>
           <a:lstStyle/>
           <a:p>
-            <a:endParaRPr lang="de-DE"/>
+            <a:endParaRPr lang="de-DE" dirty="0"/>
           </a:p>
         </p:txBody>
       </p:sp>
@@ -4105,7 +4120,7 @@
       </p:grpSpPr>
       <p:sp>
         <p:nvSpPr>
-          <p:cNvPr id="4" name="Title 3"/>
+          <p:cNvPr id="2" name="Title 1"/>
           <p:cNvSpPr>
             <a:spLocks noGrp="1"/>
           </p:cNvSpPr>
@@ -4120,7 +4135,7 @@
           <a:p>
             <a:r>
               <a:rPr lang="de-DE" dirty="0" smtClean="0"/>
-              <a:t>Nützliche Erkenntnisse</a:t>
+              <a:t>Neue Werkzeuge und Technologien</a:t>
             </a:r>
             <a:endParaRPr lang="de-DE" dirty="0"/>
           </a:p>
@@ -4128,7 +4143,7 @@
       </p:sp>
       <p:sp>
         <p:nvSpPr>
-          <p:cNvPr id="5" name="Content Placeholder 4"/>
+          <p:cNvPr id="3" name="Content Placeholder 2"/>
           <p:cNvSpPr>
             <a:spLocks noGrp="1"/>
           </p:cNvSpPr>
@@ -4136,30 +4151,64 @@
             <p:ph idx="1"/>
           </p:nvPr>
         </p:nvSpPr>
-        <p:spPr/>
-        <p:txBody>
-          <a:bodyPr/>
-          <a:lstStyle/>
+        <p:spPr>
+          <a:xfrm>
+            <a:off x="549275" y="1729277"/>
+            <a:ext cx="8042276" cy="4850080"/>
+          </a:xfrm>
+        </p:spPr>
+        <p:txBody>
+          <a:bodyPr>
+            <a:normAutofit/>
+          </a:bodyPr>
+          <a:lstStyle/>
+          <a:p>
+            <a:pPr>
+              <a:buNone/>
+            </a:pPr>
+            <a:r>
+              <a:rPr lang="de-DE" dirty="0" smtClean="0"/>
+              <a:t>- 	</a:t>
+            </a:r>
+            <a:r>
+              <a:rPr lang="de-DE" dirty="0" err="1" smtClean="0"/>
+              <a:t>Hibernate</a:t>
+            </a:r>
+            <a:r>
+              <a:rPr lang="de-DE" dirty="0" smtClean="0"/>
+              <a:t> zum Übertragen und Verwalten unser Datenklassen in eine relationale Datenbank</a:t>
+            </a:r>
+          </a:p>
+          <a:p>
+            <a:pPr>
+              <a:buNone/>
+            </a:pPr>
+            <a:r>
+              <a:rPr lang="de-DE" dirty="0" smtClean="0"/>
+              <a:t>-	H2 die verwendete relationale Datenbank für die Persistenz der, vom Nutzer eingetragene, Information</a:t>
+            </a:r>
+          </a:p>
+          <a:p>
+            <a:pPr>
+              <a:buNone/>
+            </a:pPr>
+            <a:r>
+              <a:rPr lang="de-DE" dirty="0" smtClean="0"/>
+              <a:t>- 	CSS um unserem Programm ein individuelleres Aussehen zu verleihen</a:t>
+            </a:r>
+          </a:p>
           <a:p>
             <a:pPr>
               <a:buFontTx/>
               <a:buChar char="-"/>
             </a:pPr>
             <a:r>
+              <a:rPr lang="de-DE" dirty="0" err="1" smtClean="0"/>
+              <a:t>JavaFX</a:t>
+            </a:r>
+            <a:r>
               <a:rPr lang="de-DE" dirty="0" smtClean="0"/>
-              <a:t>D</a:t>
-            </a:r>
-            <a:r>
-              <a:rPr lang="de-DE" dirty="0" smtClean="0"/>
-              <a:t>as </a:t>
-            </a:r>
-            <a:r>
-              <a:rPr lang="de-DE" dirty="0" smtClean="0"/>
-              <a:t>A</a:t>
-            </a:r>
-            <a:r>
-              <a:rPr lang="de-DE" dirty="0" smtClean="0"/>
-              <a:t>rbeiten mit einem Versionsmanagement Programms</a:t>
+              <a:t> um die Benutzeroberfläche zu verwalten</a:t>
             </a:r>
           </a:p>
           <a:p>
@@ -4167,19 +4216,105 @@
               <a:buFontTx/>
               <a:buChar char="-"/>
             </a:pPr>
+            <a:endParaRPr lang="de-DE" dirty="0" smtClean="0"/>
+          </a:p>
+          <a:p>
+            <a:pPr>
+              <a:buNone/>
+            </a:pPr>
+            <a:endParaRPr lang="de-DE" dirty="0"/>
+          </a:p>
+        </p:txBody>
+      </p:sp>
+    </p:spTree>
+  </p:cSld>
+  <p:clrMapOvr>
+    <a:masterClrMapping/>
+  </p:clrMapOvr>
+</p:sld>
+</file>
+
+<file path=ppt/slides/slide7.xml><?xml version="1.0" encoding="utf-8"?>
+<p:sld xmlns:a="http://schemas.openxmlformats.org/drawingml/2006/main" xmlns:r="http://schemas.openxmlformats.org/officeDocument/2006/relationships" xmlns:mc="http://schemas.openxmlformats.org/markup-compatibility/2006" xmlns:mv="urn:schemas-microsoft-com:mac:vml" xmlns:p="http://schemas.openxmlformats.org/presentationml/2006/main" mc:Ignorable="mv" mc:PreserveAttributes="mv:*">
+  <p:cSld>
+    <p:spTree>
+      <p:nvGrpSpPr>
+        <p:cNvPr id="1" name=""/>
+        <p:cNvGrpSpPr/>
+        <p:nvPr/>
+      </p:nvGrpSpPr>
+      <p:grpSpPr>
+        <a:xfrm>
+          <a:off x="0" y="0"/>
+          <a:ext cx="0" cy="0"/>
+          <a:chOff x="0" y="0"/>
+          <a:chExt cx="0" cy="0"/>
+        </a:xfrm>
+      </p:grpSpPr>
+      <p:sp>
+        <p:nvSpPr>
+          <p:cNvPr id="2" name="Title 1"/>
+          <p:cNvSpPr>
+            <a:spLocks noGrp="1"/>
+          </p:cNvSpPr>
+          <p:nvPr>
+            <p:ph type="title"/>
+          </p:nvPr>
+        </p:nvSpPr>
+        <p:spPr/>
+        <p:txBody>
+          <a:bodyPr/>
+          <a:lstStyle/>
+          <a:p>
             <a:r>
               <a:rPr lang="de-DE" dirty="0" smtClean="0"/>
-              <a:t>Einen strukturierten Verlauf des Entwickelns.</a:t>
-            </a:r>
-          </a:p>
+              <a:t>Neue Werkzeuge und Technologien</a:t>
+            </a:r>
+            <a:endParaRPr lang="de-DE" dirty="0"/>
+          </a:p>
+        </p:txBody>
+      </p:sp>
+      <p:sp>
+        <p:nvSpPr>
+          <p:cNvPr id="3" name="Content Placeholder 2"/>
+          <p:cNvSpPr>
+            <a:spLocks noGrp="1"/>
+          </p:cNvSpPr>
+          <p:nvPr>
+            <p:ph idx="1"/>
+          </p:nvPr>
+        </p:nvSpPr>
+        <p:spPr>
+          <a:xfrm>
+            <a:off x="549275" y="1444532"/>
+            <a:ext cx="8042276" cy="5134825"/>
+          </a:xfrm>
+        </p:spPr>
+        <p:txBody>
+          <a:bodyPr>
+            <a:normAutofit/>
+          </a:bodyPr>
+          <a:lstStyle/>
           <a:p>
             <a:pPr>
               <a:buFontTx/>
               <a:buChar char="-"/>
             </a:pPr>
             <a:r>
+              <a:rPr lang="de-DE" dirty="0" err="1" smtClean="0"/>
+              <a:t>Scenebuilder</a:t>
+            </a:r>
+            <a:r>
               <a:rPr lang="de-DE" dirty="0" smtClean="0"/>
-              <a:t>Die unterschiedliche Arten der Entwickelung eines Programms</a:t>
+              <a:t> </a:t>
+            </a:r>
+            <a:r>
+              <a:rPr lang="de-DE" dirty="0" smtClean="0"/>
+              <a:t>um das Erstellen der Benutzeroberfläche durch visuelle Elemente zu </a:t>
+            </a:r>
+            <a:r>
+              <a:rPr lang="de-DE" dirty="0" smtClean="0"/>
+              <a:t>vereinfachen</a:t>
             </a:r>
           </a:p>
           <a:p>
@@ -4189,9 +4324,249 @@
             </a:pPr>
             <a:r>
               <a:rPr lang="de-DE" dirty="0" smtClean="0"/>
-              <a:t>Die Notwendigkeit von frühem Testen</a:t>
-            </a:r>
+              <a:t>Code </a:t>
+            </a:r>
+            <a:r>
+              <a:rPr lang="de-DE" dirty="0" err="1" smtClean="0"/>
+              <a:t>Coverage</a:t>
+            </a:r>
+            <a:r>
+              <a:rPr lang="de-DE" dirty="0" smtClean="0"/>
+              <a:t> Tool, das die Test</a:t>
+            </a:r>
+            <a:r>
+              <a:rPr lang="de-DE" dirty="0" smtClean="0"/>
+              <a:t>ü</a:t>
+            </a:r>
+            <a:r>
+              <a:rPr lang="de-DE" dirty="0" smtClean="0"/>
+              <a:t>berdeckung übersichtlicher macht</a:t>
+            </a:r>
+          </a:p>
+          <a:p>
+            <a:pPr>
+              <a:buFontTx/>
+              <a:buChar char="-"/>
+            </a:pPr>
+            <a:endParaRPr lang="de-DE" dirty="0" smtClean="0"/>
+          </a:p>
+          <a:p>
+            <a:pPr>
+              <a:buNone/>
+            </a:pPr>
             <a:endParaRPr lang="de-DE" dirty="0"/>
+          </a:p>
+        </p:txBody>
+      </p:sp>
+    </p:spTree>
+  </p:cSld>
+  <p:clrMapOvr>
+    <a:masterClrMapping/>
+  </p:clrMapOvr>
+</p:sld>
+</file>
+
+<file path=ppt/slides/slide8.xml><?xml version="1.0" encoding="utf-8"?>
+<p:sld xmlns:a="http://schemas.openxmlformats.org/drawingml/2006/main" xmlns:r="http://schemas.openxmlformats.org/officeDocument/2006/relationships" xmlns:mc="http://schemas.openxmlformats.org/markup-compatibility/2006" xmlns:mv="urn:schemas-microsoft-com:mac:vml" xmlns:p="http://schemas.openxmlformats.org/presentationml/2006/main" mc:Ignorable="mv" mc:PreserveAttributes="mv:*">
+  <p:cSld>
+    <p:spTree>
+      <p:nvGrpSpPr>
+        <p:cNvPr id="1" name=""/>
+        <p:cNvGrpSpPr/>
+        <p:nvPr/>
+      </p:nvGrpSpPr>
+      <p:grpSpPr>
+        <a:xfrm>
+          <a:off x="0" y="0"/>
+          <a:ext cx="0" cy="0"/>
+          <a:chOff x="0" y="0"/>
+          <a:chExt cx="0" cy="0"/>
+        </a:xfrm>
+      </p:grpSpPr>
+      <p:sp>
+        <p:nvSpPr>
+          <p:cNvPr id="2" name="Title 1"/>
+          <p:cNvSpPr>
+            <a:spLocks noGrp="1"/>
+          </p:cNvSpPr>
+          <p:nvPr>
+            <p:ph type="title"/>
+          </p:nvPr>
+        </p:nvSpPr>
+        <p:spPr/>
+        <p:txBody>
+          <a:bodyPr/>
+          <a:lstStyle/>
+          <a:p>
+            <a:r>
+              <a:rPr lang="de-DE" dirty="0" smtClean="0"/>
+              <a:t>Erfahrungen</a:t>
+            </a:r>
+            <a:endParaRPr lang="de-DE" dirty="0"/>
+          </a:p>
+        </p:txBody>
+      </p:sp>
+      <p:sp>
+        <p:nvSpPr>
+          <p:cNvPr id="3" name="Content Placeholder 2"/>
+          <p:cNvSpPr>
+            <a:spLocks noGrp="1"/>
+          </p:cNvSpPr>
+          <p:nvPr>
+            <p:ph idx="1"/>
+          </p:nvPr>
+        </p:nvSpPr>
+        <p:spPr/>
+        <p:txBody>
+          <a:bodyPr>
+            <a:normAutofit/>
+          </a:bodyPr>
+          <a:lstStyle/>
+          <a:p>
+            <a:pPr>
+              <a:buFontTx/>
+              <a:buChar char="-"/>
+            </a:pPr>
+            <a:r>
+              <a:rPr lang="de-DE" dirty="0" smtClean="0"/>
+              <a:t>Gute Stimmung ist wichtig für produktives Arbeiten</a:t>
+            </a:r>
+          </a:p>
+          <a:p>
+            <a:pPr>
+              <a:buFontTx/>
+              <a:buChar char="-"/>
+            </a:pPr>
+            <a:r>
+              <a:rPr lang="de-DE" dirty="0" smtClean="0"/>
+              <a:t>Mehr kann geschafft werden als man erwartet, wenn man gut geplant arbeitet</a:t>
+            </a:r>
+          </a:p>
+          <a:p>
+            <a:pPr>
+              <a:buFontTx/>
+              <a:buChar char="-"/>
+            </a:pPr>
+            <a:r>
+              <a:rPr lang="de-DE" dirty="0" smtClean="0"/>
+              <a:t>Prioritäten setzen und diesen folgen.</a:t>
+            </a:r>
+          </a:p>
+          <a:p>
+            <a:pPr>
+              <a:buFontTx/>
+              <a:buChar char="-"/>
+            </a:pPr>
+            <a:r>
+              <a:rPr lang="de-DE" dirty="0" smtClean="0"/>
+              <a:t>Wissen wann etwas weniger wichtiges beiseite fallen muss</a:t>
+            </a:r>
+          </a:p>
+          <a:p>
+            <a:pPr>
+              <a:buFontTx/>
+              <a:buChar char="-"/>
+            </a:pPr>
+            <a:r>
+              <a:rPr lang="de-DE" dirty="0" smtClean="0"/>
+              <a:t>Feedback vom Kunde ist wertvoll</a:t>
+            </a:r>
+          </a:p>
+        </p:txBody>
+      </p:sp>
+    </p:spTree>
+  </p:cSld>
+  <p:clrMapOvr>
+    <a:masterClrMapping/>
+  </p:clrMapOvr>
+</p:sld>
+</file>
+
+<file path=ppt/slides/slide9.xml><?xml version="1.0" encoding="utf-8"?>
+<p:sld xmlns:a="http://schemas.openxmlformats.org/drawingml/2006/main" xmlns:r="http://schemas.openxmlformats.org/officeDocument/2006/relationships" xmlns:mc="http://schemas.openxmlformats.org/markup-compatibility/2006" xmlns:mv="urn:schemas-microsoft-com:mac:vml" xmlns:p="http://schemas.openxmlformats.org/presentationml/2006/main" mc:Ignorable="mv" mc:PreserveAttributes="mv:*">
+  <p:cSld>
+    <p:spTree>
+      <p:nvGrpSpPr>
+        <p:cNvPr id="1" name=""/>
+        <p:cNvGrpSpPr/>
+        <p:nvPr/>
+      </p:nvGrpSpPr>
+      <p:grpSpPr>
+        <a:xfrm>
+          <a:off x="0" y="0"/>
+          <a:ext cx="0" cy="0"/>
+          <a:chOff x="0" y="0"/>
+          <a:chExt cx="0" cy="0"/>
+        </a:xfrm>
+      </p:grpSpPr>
+      <p:sp>
+        <p:nvSpPr>
+          <p:cNvPr id="2" name="Title 1"/>
+          <p:cNvSpPr>
+            <a:spLocks noGrp="1"/>
+          </p:cNvSpPr>
+          <p:nvPr>
+            <p:ph type="title"/>
+          </p:nvPr>
+        </p:nvSpPr>
+        <p:spPr/>
+        <p:txBody>
+          <a:bodyPr/>
+          <a:lstStyle/>
+          <a:p>
+            <a:r>
+              <a:rPr lang="de-DE" dirty="0" smtClean="0"/>
+              <a:t>Erfahrungen</a:t>
+            </a:r>
+            <a:endParaRPr lang="de-DE" dirty="0"/>
+          </a:p>
+        </p:txBody>
+      </p:sp>
+      <p:sp>
+        <p:nvSpPr>
+          <p:cNvPr id="3" name="Content Placeholder 2"/>
+          <p:cNvSpPr>
+            <a:spLocks noGrp="1"/>
+          </p:cNvSpPr>
+          <p:nvPr>
+            <p:ph idx="1"/>
+          </p:nvPr>
+        </p:nvSpPr>
+        <p:spPr/>
+        <p:txBody>
+          <a:bodyPr>
+            <a:normAutofit/>
+          </a:bodyPr>
+          <a:lstStyle/>
+          <a:p>
+            <a:pPr>
+              <a:buFontTx/>
+              <a:buChar char="-"/>
+            </a:pPr>
+            <a:r>
+              <a:rPr lang="de-DE" dirty="0" smtClean="0"/>
+              <a:t>Arbeiten an einem Programm mit der selben Gruppe von Personen über größere Zeitspannen.</a:t>
+            </a:r>
+          </a:p>
+          <a:p>
+            <a:pPr>
+              <a:buFontTx/>
+              <a:buChar char="-"/>
+            </a:pPr>
+            <a:r>
+              <a:rPr lang="de-DE" dirty="0" smtClean="0"/>
+              <a:t>Organisation zwischen Teammitgliedern und dem Kunden.</a:t>
+            </a:r>
+          </a:p>
+          <a:p>
+            <a:pPr>
+              <a:buFontTx/>
+              <a:buChar char="-"/>
+            </a:pPr>
+            <a:r>
+              <a:rPr lang="de-DE" dirty="0" smtClean="0"/>
+              <a:t>Schätzen der benötigten Zeit für ein Teil des Programms kann schwer sein.</a:t>
+            </a:r>
           </a:p>
         </p:txBody>
       </p:sp>

</xml_diff>

<commit_message>
weiteres zum vortrag hinzugefuegt
</commit_message>
<xml_diff>
--- a/Dokumente/SWT-Vortrag/SWTStudentenVortrag.pptx
+++ b/Dokumente/SWT-Vortrag/SWTStudentenVortrag.pptx
@@ -4015,6 +4015,25 @@
               <a:buFontTx/>
               <a:buChar char="-"/>
             </a:pPr>
+            <a:r>
+              <a:rPr lang="de-DE" dirty="0" err="1" smtClean="0"/>
+              <a:t>Coding</a:t>
+            </a:r>
+            <a:r>
+              <a:rPr lang="de-DE" dirty="0" smtClean="0"/>
+              <a:t> </a:t>
+            </a:r>
+            <a:r>
+              <a:rPr lang="de-DE" dirty="0" err="1" smtClean="0"/>
+              <a:t>Conventions</a:t>
+            </a:r>
+            <a:endParaRPr lang="de-DE" dirty="0" smtClean="0"/>
+          </a:p>
+          <a:p>
+            <a:pPr>
+              <a:buFontTx/>
+              <a:buChar char="-"/>
+            </a:pPr>
             <a:endParaRPr lang="de-DE" dirty="0" smtClean="0"/>
           </a:p>
           <a:p>
@@ -4341,6 +4360,28 @@
             <a:r>
               <a:rPr lang="de-DE" dirty="0" smtClean="0"/>
               <a:t>berdeckung übersichtlicher macht</a:t>
+            </a:r>
+          </a:p>
+          <a:p>
+            <a:pPr>
+              <a:buFontTx/>
+              <a:buChar char="-"/>
+            </a:pPr>
+            <a:r>
+              <a:rPr lang="de-DE" dirty="0" err="1" smtClean="0"/>
+              <a:t>Db-Visualizer</a:t>
+            </a:r>
+            <a:r>
+              <a:rPr lang="de-DE" dirty="0" smtClean="0"/>
+              <a:t> um die Datenbank einfacher </a:t>
+            </a:r>
+            <a:r>
+              <a:rPr lang="de-DE" smtClean="0"/>
+              <a:t>zu überprüfen, </a:t>
+            </a:r>
+            <a:r>
+              <a:rPr lang="de-DE" dirty="0" smtClean="0"/>
+              <a:t>mittels einer tabellarischen Darstellung</a:t>
             </a:r>
           </a:p>
           <a:p>

</xml_diff>

<commit_message>
Etwas sauberere Version, mit dem Hintergrund meiner letztem Vortrag
</commit_message>
<xml_diff>
--- a/Dokumente/SWT-Vortrag/SWTStudentenVortrag.pptx
+++ b/Dokumente/SWT-Vortrag/SWTStudentenVortrag.pptx
@@ -2,7 +2,7 @@
 <file path=ppt/presentation.xml><?xml version="1.0" encoding="utf-8"?>
 <p:presentation xmlns:a="http://schemas.openxmlformats.org/drawingml/2006/main" xmlns:r="http://schemas.openxmlformats.org/officeDocument/2006/relationships" xmlns:mc="http://schemas.openxmlformats.org/markup-compatibility/2006" xmlns:mv="urn:schemas-microsoft-com:mac:vml" xmlns:p="http://schemas.openxmlformats.org/presentationml/2006/main" mc:Ignorable="mv" mc:PreserveAttributes="mv:*" saveSubsetFonts="1" autoCompressPictures="0">
   <p:sldMasterIdLst>
-    <p:sldMasterId id="2147483684" r:id="rId1"/>
+    <p:sldMasterId id="2147483697" r:id="rId1"/>
   </p:sldMasterIdLst>
   <p:sldIdLst>
     <p:sldId id="256" r:id="rId2"/>
@@ -11,9 +11,8 @@
     <p:sldId id="263" r:id="rId5"/>
     <p:sldId id="259" r:id="rId6"/>
     <p:sldId id="257" r:id="rId7"/>
-    <p:sldId id="264" r:id="rId8"/>
-    <p:sldId id="258" r:id="rId9"/>
-    <p:sldId id="262" r:id="rId10"/>
+    <p:sldId id="258" r:id="rId8"/>
+    <p:sldId id="262" r:id="rId9"/>
   </p:sldIdLst>
   <p:sldSz cx="9144000" cy="6858000" type="screen4x3"/>
   <p:notesSz cx="6858000" cy="9144000"/>
@@ -134,161 +133,59 @@
       </p:grpSpPr>
       <p:sp>
         <p:nvSpPr>
-          <p:cNvPr id="7" name="Rectangle 6"/>
-          <p:cNvSpPr/>
-          <p:nvPr/>
+          <p:cNvPr id="2" name="Title 1"/>
+          <p:cNvSpPr>
+            <a:spLocks noGrp="1"/>
+          </p:cNvSpPr>
+          <p:nvPr>
+            <p:ph type="ctrTitle"/>
+          </p:nvPr>
         </p:nvSpPr>
         <p:spPr>
           <a:xfrm>
-            <a:off x="1328166" y="1295400"/>
-            <a:ext cx="6487668" cy="3152887"/>
+            <a:off x="685800" y="2130425"/>
+            <a:ext cx="7772400" cy="1470025"/>
           </a:xfrm>
-          <a:prstGeom prst="rect">
-            <a:avLst/>
-          </a:prstGeom>
-          <a:ln w="3175">
-            <a:solidFill>
-              <a:schemeClr val="bg1"/>
-            </a:solidFill>
-          </a:ln>
-          <a:effectLst>
-            <a:outerShdw blurRad="63500" sx="100500" sy="100500" algn="ctr" rotWithShape="0">
-              <a:prstClr val="black">
-                <a:alpha val="50000"/>
-              </a:prstClr>
-            </a:outerShdw>
-          </a:effectLst>
         </p:spPr>
         <p:txBody>
-          <a:bodyPr vert="horz" lIns="91440" tIns="45720" rIns="91440" bIns="45720" rtlCol="0">
-            <a:normAutofit/>
-          </a:bodyPr>
-          <a:lstStyle/>
-          <a:p>
-            <a:pPr marL="0" indent="0" algn="l" defTabSz="914400" rtl="0" eaLnBrk="1" latinLnBrk="0" hangingPunct="1">
-              <a:spcBef>
-                <a:spcPts val="2000"/>
-              </a:spcBef>
-              <a:buClr>
-                <a:schemeClr val="accent1">
-                  <a:lumMod val="60000"/>
-                  <a:lumOff val="40000"/>
-                </a:schemeClr>
-              </a:buClr>
-              <a:buSzPct val="110000"/>
-              <a:buFont typeface="Wingdings 2" pitchFamily="18" charset="2"/>
-              <a:buNone/>
-            </a:pPr>
-            <a:endParaRPr sz="3200" kern="1200">
-              <a:solidFill>
-                <a:schemeClr val="tx1">
-                  <a:lumMod val="65000"/>
-                  <a:lumOff val="35000"/>
-                </a:schemeClr>
-              </a:solidFill>
-              <a:latin typeface="+mn-lt"/>
-              <a:ea typeface="+mn-ea"/>
-              <a:cs typeface="+mn-cs"/>
-            </a:endParaRPr>
-          </a:p>
-        </p:txBody>
-      </p:sp>
-      <p:sp>
-        <p:nvSpPr>
-          <p:cNvPr id="2" name="Title 1"/>
-          <p:cNvSpPr>
-            <a:spLocks noGrp="1"/>
-          </p:cNvSpPr>
-          <p:nvPr>
-            <p:ph type="ctrTitle"/>
+          <a:bodyPr/>
+          <a:lstStyle/>
+          <a:p>
+            <a:r>
+              <a:rPr lang="en-US" smtClean="0"/>
+              <a:t>Click to edit Master title style</a:t>
+            </a:r>
+            <a:endParaRPr lang="en-US"/>
+          </a:p>
+        </p:txBody>
+      </p:sp>
+      <p:sp>
+        <p:nvSpPr>
+          <p:cNvPr id="3" name="Subtitle 2"/>
+          <p:cNvSpPr>
+            <a:spLocks noGrp="1"/>
+          </p:cNvSpPr>
+          <p:nvPr>
+            <p:ph type="subTitle" idx="1"/>
           </p:nvPr>
         </p:nvSpPr>
         <p:spPr>
           <a:xfrm>
-            <a:off x="1322921" y="1523999"/>
-            <a:ext cx="6498158" cy="1724867"/>
+            <a:off x="1371600" y="3886200"/>
+            <a:ext cx="6400800" cy="1752600"/>
           </a:xfrm>
         </p:spPr>
         <p:txBody>
-          <a:bodyPr vert="horz" lIns="91440" tIns="45720" rIns="91440" bIns="45720" rtlCol="0" anchor="b" anchorCtr="0">
-            <a:noAutofit/>
-          </a:bodyPr>
+          <a:bodyPr/>
           <a:lstStyle>
-            <a:lvl1pPr marL="0" indent="0" algn="ctr" defTabSz="914400" rtl="0" eaLnBrk="1" latinLnBrk="0" hangingPunct="1">
-              <a:spcBef>
-                <a:spcPct val="0"/>
-              </a:spcBef>
-              <a:buClr>
-                <a:schemeClr val="accent1">
-                  <a:lumMod val="60000"/>
-                  <a:lumOff val="40000"/>
-                </a:schemeClr>
-              </a:buClr>
-              <a:buSzPct val="110000"/>
-              <a:buFont typeface="Wingdings 2" pitchFamily="18" charset="2"/>
-              <a:buNone/>
-              <a:defRPr sz="4600" kern="1200">
-                <a:solidFill>
-                  <a:schemeClr val="accent1"/>
-                </a:solidFill>
-                <a:latin typeface="+mj-lt"/>
-                <a:ea typeface="+mj-ea"/>
-                <a:cs typeface="+mj-cs"/>
-              </a:defRPr>
-            </a:lvl1pPr>
-          </a:lstStyle>
-          <a:p>
-            <a:r>
-              <a:rPr lang="en-US" smtClean="0"/>
-              <a:t>Click to edit Master title style</a:t>
-            </a:r>
-            <a:endParaRPr/>
-          </a:p>
-        </p:txBody>
-      </p:sp>
-      <p:sp>
-        <p:nvSpPr>
-          <p:cNvPr id="3" name="Subtitle 2"/>
-          <p:cNvSpPr>
-            <a:spLocks noGrp="1"/>
-          </p:cNvSpPr>
-          <p:nvPr>
-            <p:ph type="subTitle" idx="1"/>
-          </p:nvPr>
-        </p:nvSpPr>
-        <p:spPr>
-          <a:xfrm>
-            <a:off x="1322921" y="3299012"/>
-            <a:ext cx="6498159" cy="916641"/>
-          </a:xfrm>
-        </p:spPr>
-        <p:txBody>
-          <a:bodyPr vert="horz" lIns="91440" tIns="45720" rIns="91440" bIns="45720" rtlCol="0">
-            <a:normAutofit/>
-          </a:bodyPr>
-          <a:lstStyle>
-            <a:lvl1pPr marL="0" indent="0" algn="ctr" defTabSz="914400" rtl="0" eaLnBrk="1" latinLnBrk="0" hangingPunct="1">
-              <a:spcBef>
-                <a:spcPts val="300"/>
-              </a:spcBef>
-              <a:buClr>
-                <a:schemeClr val="accent1">
-                  <a:lumMod val="60000"/>
-                  <a:lumOff val="40000"/>
-                </a:schemeClr>
-              </a:buClr>
-              <a:buSzPct val="110000"/>
-              <a:buFont typeface="Wingdings 2" pitchFamily="18" charset="2"/>
-              <a:buNone/>
-              <a:defRPr sz="1800" kern="1200">
+            <a:lvl1pPr marL="0" indent="0" algn="ctr">
+              <a:buNone/>
+              <a:defRPr>
                 <a:solidFill>
                   <a:schemeClr val="tx1">
                     <a:tint val="75000"/>
                   </a:schemeClr>
                 </a:solidFill>
-                <a:latin typeface="+mn-lt"/>
-                <a:ea typeface="+mn-ea"/>
-                <a:cs typeface="+mn-cs"/>
               </a:defRPr>
             </a:lvl1pPr>
             <a:lvl2pPr marL="457200" indent="0" algn="ctr">
@@ -377,7 +274,7 @@
               <a:rPr lang="en-US" smtClean="0"/>
               <a:t>Click to edit Master subtitle style</a:t>
             </a:r>
-            <a:endParaRPr/>
+            <a:endParaRPr lang="en-US"/>
           </a:p>
         </p:txBody>
       </p:sp>
@@ -398,7 +295,8 @@
           <a:p>
             <a:fld id="{C243C423-A908-1A4E-AAF6-CA2CF58F85BA}" type="datetimeFigureOut">
               <a:rPr lang="en-US" smtClean="0"/>
-              <a:t>10/18/15</a:t>
+              <a:pPr/>
+              <a:t>10/20/15</a:t>
             </a:fld>
             <a:endParaRPr lang="de-DE"/>
           </a:p>
@@ -440,6 +338,7 @@
           <a:p>
             <a:fld id="{2E7E1A50-6DED-3042-A0E3-1B35F38C2747}" type="slidenum">
               <a:rPr lang="de-DE" smtClean="0"/>
+              <a:pPr/>
               <a:t>‹#›</a:t>
             </a:fld>
             <a:endParaRPr lang="de-DE"/>
@@ -455,295 +354,6 @@
 </file>
 
 <file path=ppt/slideLayouts/slideLayout10.xml><?xml version="1.0" encoding="utf-8"?>
-<p:sldLayout xmlns:a="http://schemas.openxmlformats.org/drawingml/2006/main" xmlns:r="http://schemas.openxmlformats.org/officeDocument/2006/relationships" xmlns:mc="http://schemas.openxmlformats.org/markup-compatibility/2006" xmlns:mv="urn:schemas-microsoft-com:mac:vml" xmlns:p="http://schemas.openxmlformats.org/presentationml/2006/main" mc:Ignorable="mv" mc:PreserveAttributes="mv:*" preserve="1">
-  <p:cSld name="Picture with Caption">
-    <p:spTree>
-      <p:nvGrpSpPr>
-        <p:cNvPr id="1" name=""/>
-        <p:cNvGrpSpPr/>
-        <p:nvPr/>
-      </p:nvGrpSpPr>
-      <p:grpSpPr>
-        <a:xfrm>
-          <a:off x="0" y="0"/>
-          <a:ext cx="0" cy="0"/>
-          <a:chOff x="0" y="0"/>
-          <a:chExt cx="0" cy="0"/>
-        </a:xfrm>
-      </p:grpSpPr>
-      <p:sp>
-        <p:nvSpPr>
-          <p:cNvPr id="2" name="Title 1"/>
-          <p:cNvSpPr>
-            <a:spLocks noGrp="1"/>
-          </p:cNvSpPr>
-          <p:nvPr>
-            <p:ph type="title"/>
-          </p:nvPr>
-        </p:nvSpPr>
-        <p:spPr>
-          <a:xfrm>
-            <a:off x="533398" y="611872"/>
-            <a:ext cx="4079545" cy="1162050"/>
-          </a:xfrm>
-        </p:spPr>
-        <p:txBody>
-          <a:bodyPr anchor="b"/>
-          <a:lstStyle>
-            <a:lvl1pPr algn="ctr">
-              <a:defRPr sz="3600" b="0"/>
-            </a:lvl1pPr>
-          </a:lstStyle>
-          <a:p>
-            <a:r>
-              <a:rPr lang="en-US" smtClean="0"/>
-              <a:t>Click to edit Master title style</a:t>
-            </a:r>
-            <a:endParaRPr/>
-          </a:p>
-        </p:txBody>
-      </p:sp>
-      <p:sp>
-        <p:nvSpPr>
-          <p:cNvPr id="4" name="Text Placeholder 3"/>
-          <p:cNvSpPr>
-            <a:spLocks noGrp="1"/>
-          </p:cNvSpPr>
-          <p:nvPr>
-            <p:ph type="body" sz="half" idx="2"/>
-          </p:nvPr>
-        </p:nvSpPr>
-        <p:spPr>
-          <a:xfrm>
-            <a:off x="533398" y="1787856"/>
-            <a:ext cx="4079545" cy="3720152"/>
-          </a:xfrm>
-        </p:spPr>
-        <p:txBody>
-          <a:bodyPr>
-            <a:normAutofit/>
-          </a:bodyPr>
-          <a:lstStyle>
-            <a:lvl1pPr marL="0" indent="0" algn="ctr">
-              <a:buNone/>
-              <a:defRPr sz="1800"/>
-            </a:lvl1pPr>
-            <a:lvl2pPr marL="457200" indent="0">
-              <a:buNone/>
-              <a:defRPr sz="1200"/>
-            </a:lvl2pPr>
-            <a:lvl3pPr marL="914400" indent="0">
-              <a:buNone/>
-              <a:defRPr sz="1000"/>
-            </a:lvl3pPr>
-            <a:lvl4pPr marL="1371600" indent="0">
-              <a:buNone/>
-              <a:defRPr sz="900"/>
-            </a:lvl4pPr>
-            <a:lvl5pPr marL="1828800" indent="0">
-              <a:buNone/>
-              <a:defRPr sz="900"/>
-            </a:lvl5pPr>
-            <a:lvl6pPr marL="2286000" indent="0">
-              <a:buNone/>
-              <a:defRPr sz="900"/>
-            </a:lvl6pPr>
-            <a:lvl7pPr marL="2743200" indent="0">
-              <a:buNone/>
-              <a:defRPr sz="900"/>
-            </a:lvl7pPr>
-            <a:lvl8pPr marL="3200400" indent="0">
-              <a:buNone/>
-              <a:defRPr sz="900"/>
-            </a:lvl8pPr>
-            <a:lvl9pPr marL="3657600" indent="0">
-              <a:buNone/>
-              <a:defRPr sz="900"/>
-            </a:lvl9pPr>
-          </a:lstStyle>
-          <a:p>
-            <a:pPr lvl="0"/>
-            <a:r>
-              <a:rPr lang="en-US" smtClean="0"/>
-              <a:t>Click to edit Master text styles</a:t>
-            </a:r>
-          </a:p>
-        </p:txBody>
-      </p:sp>
-      <p:sp>
-        <p:nvSpPr>
-          <p:cNvPr id="5" name="Date Placeholder 4"/>
-          <p:cNvSpPr>
-            <a:spLocks noGrp="1"/>
-          </p:cNvSpPr>
-          <p:nvPr>
-            <p:ph type="dt" sz="half" idx="10"/>
-          </p:nvPr>
-        </p:nvSpPr>
-        <p:spPr/>
-        <p:txBody>
-          <a:bodyPr/>
-          <a:lstStyle/>
-          <a:p>
-            <a:fld id="{C243C423-A908-1A4E-AAF6-CA2CF58F85BA}" type="datetimeFigureOut">
-              <a:rPr lang="en-US" smtClean="0"/>
-              <a:t>10/18/15</a:t>
-            </a:fld>
-            <a:endParaRPr lang="de-DE"/>
-          </a:p>
-        </p:txBody>
-      </p:sp>
-      <p:sp>
-        <p:nvSpPr>
-          <p:cNvPr id="6" name="Footer Placeholder 5"/>
-          <p:cNvSpPr>
-            <a:spLocks noGrp="1"/>
-          </p:cNvSpPr>
-          <p:nvPr>
-            <p:ph type="ftr" sz="quarter" idx="11"/>
-          </p:nvPr>
-        </p:nvSpPr>
-        <p:spPr/>
-        <p:txBody>
-          <a:bodyPr/>
-          <a:lstStyle/>
-          <a:p>
-            <a:endParaRPr lang="de-DE"/>
-          </a:p>
-        </p:txBody>
-      </p:sp>
-      <p:sp>
-        <p:nvSpPr>
-          <p:cNvPr id="7" name="Slide Number Placeholder 6"/>
-          <p:cNvSpPr>
-            <a:spLocks noGrp="1"/>
-          </p:cNvSpPr>
-          <p:nvPr>
-            <p:ph type="sldNum" sz="quarter" idx="12"/>
-          </p:nvPr>
-        </p:nvSpPr>
-        <p:spPr/>
-        <p:txBody>
-          <a:bodyPr/>
-          <a:lstStyle/>
-          <a:p>
-            <a:fld id="{2E7E1A50-6DED-3042-A0E3-1B35F38C2747}" type="slidenum">
-              <a:rPr lang="de-DE" smtClean="0"/>
-              <a:t>‹#›</a:t>
-            </a:fld>
-            <a:endParaRPr lang="de-DE"/>
-          </a:p>
-        </p:txBody>
-      </p:sp>
-      <p:sp>
-        <p:nvSpPr>
-          <p:cNvPr id="8" name="Picture Placeholder 2"/>
-          <p:cNvSpPr>
-            <a:spLocks noGrp="1"/>
-          </p:cNvSpPr>
-          <p:nvPr>
-            <p:ph type="pic" idx="1"/>
-          </p:nvPr>
-        </p:nvSpPr>
-        <p:spPr>
-          <a:xfrm>
-            <a:off x="5090617" y="359392"/>
-            <a:ext cx="3657600" cy="5318077"/>
-          </a:xfrm>
-          <a:ln w="3175">
-            <a:solidFill>
-              <a:schemeClr val="bg1"/>
-            </a:solidFill>
-          </a:ln>
-          <a:effectLst>
-            <a:outerShdw blurRad="63500" sx="100500" sy="100500" algn="ctr" rotWithShape="0">
-              <a:prstClr val="black">
-                <a:alpha val="50000"/>
-              </a:prstClr>
-            </a:outerShdw>
-          </a:effectLst>
-        </p:spPr>
-        <p:txBody>
-          <a:bodyPr vert="horz" lIns="91440" tIns="45720" rIns="91440" bIns="45720" rtlCol="0">
-            <a:normAutofit/>
-          </a:bodyPr>
-          <a:lstStyle>
-            <a:lvl1pPr marL="0" indent="0" algn="l" defTabSz="914400" rtl="0" eaLnBrk="1" latinLnBrk="0" hangingPunct="1">
-              <a:spcBef>
-                <a:spcPts val="2000"/>
-              </a:spcBef>
-              <a:buClr>
-                <a:schemeClr val="accent1">
-                  <a:lumMod val="60000"/>
-                  <a:lumOff val="40000"/>
-                </a:schemeClr>
-              </a:buClr>
-              <a:buSzPct val="110000"/>
-              <a:buFont typeface="Wingdings 2" pitchFamily="18" charset="2"/>
-              <a:buNone/>
-              <a:defRPr sz="3200" kern="1200">
-                <a:solidFill>
-                  <a:schemeClr val="tx1">
-                    <a:lumMod val="65000"/>
-                    <a:lumOff val="35000"/>
-                  </a:schemeClr>
-                </a:solidFill>
-                <a:latin typeface="+mn-lt"/>
-                <a:ea typeface="+mn-ea"/>
-                <a:cs typeface="+mn-cs"/>
-              </a:defRPr>
-            </a:lvl1pPr>
-            <a:lvl2pPr marL="457200" indent="0">
-              <a:buNone/>
-              <a:defRPr sz="2800"/>
-            </a:lvl2pPr>
-            <a:lvl3pPr marL="914400" indent="0">
-              <a:buNone/>
-              <a:defRPr sz="2400"/>
-            </a:lvl3pPr>
-            <a:lvl4pPr marL="1371600" indent="0">
-              <a:buNone/>
-              <a:defRPr sz="2000"/>
-            </a:lvl4pPr>
-            <a:lvl5pPr marL="1828800" indent="0">
-              <a:buNone/>
-              <a:defRPr sz="2000"/>
-            </a:lvl5pPr>
-            <a:lvl6pPr marL="2286000" indent="0">
-              <a:buNone/>
-              <a:defRPr sz="2000"/>
-            </a:lvl6pPr>
-            <a:lvl7pPr marL="2743200" indent="0">
-              <a:buNone/>
-              <a:defRPr sz="2000"/>
-            </a:lvl7pPr>
-            <a:lvl8pPr marL="3200400" indent="0">
-              <a:buNone/>
-              <a:defRPr sz="2000"/>
-            </a:lvl8pPr>
-            <a:lvl9pPr marL="3657600" indent="0">
-              <a:buNone/>
-              <a:defRPr sz="2000"/>
-            </a:lvl9pPr>
-          </a:lstStyle>
-          <a:p>
-            <a:r>
-              <a:rPr lang="en-US" smtClean="0"/>
-              <a:t>Click icon to add picture</a:t>
-            </a:r>
-            <a:endParaRPr/>
-          </a:p>
-        </p:txBody>
-      </p:sp>
-    </p:spTree>
-  </p:cSld>
-  <p:clrMapOvr>
-    <a:masterClrMapping/>
-  </p:clrMapOvr>
-</p:sldLayout>
-</file>
-
-<file path=ppt/slideLayouts/slideLayout11.xml><?xml version="1.0" encoding="utf-8"?>
 <p:sldLayout xmlns:a="http://schemas.openxmlformats.org/drawingml/2006/main" xmlns:r="http://schemas.openxmlformats.org/officeDocument/2006/relationships" xmlns:mc="http://schemas.openxmlformats.org/markup-compatibility/2006" xmlns:mv="urn:schemas-microsoft-com:mac:vml" xmlns:p="http://schemas.openxmlformats.org/presentationml/2006/main" mc:Ignorable="mv" mc:PreserveAttributes="mv:*" type="vertTx" preserve="1">
   <p:cSld name="Title and Vertical Text">
     <p:spTree>
@@ -779,7 +389,7 @@
               <a:rPr lang="en-US" smtClean="0"/>
               <a:t>Click to edit Master title style</a:t>
             </a:r>
-            <a:endParaRPr/>
+            <a:endParaRPr lang="en-US"/>
           </a:p>
         </p:txBody>
       </p:sp>
@@ -831,7 +441,7 @@
               <a:rPr lang="en-US" smtClean="0"/>
               <a:t>Fifth level</a:t>
             </a:r>
-            <a:endParaRPr/>
+            <a:endParaRPr lang="en-US"/>
           </a:p>
         </p:txBody>
       </p:sp>
@@ -852,7 +462,8 @@
           <a:p>
             <a:fld id="{C243C423-A908-1A4E-AAF6-CA2CF58F85BA}" type="datetimeFigureOut">
               <a:rPr lang="en-US" smtClean="0"/>
-              <a:t>10/18/15</a:t>
+              <a:pPr/>
+              <a:t>10/20/15</a:t>
             </a:fld>
             <a:endParaRPr lang="de-DE"/>
           </a:p>
@@ -894,6 +505,7 @@
           <a:p>
             <a:fld id="{2E7E1A50-6DED-3042-A0E3-1B35F38C2747}" type="slidenum">
               <a:rPr lang="de-DE" smtClean="0"/>
+              <a:pPr/>
               <a:t>‹#›</a:t>
             </a:fld>
             <a:endParaRPr lang="de-DE"/>
@@ -908,7 +520,7 @@
 </p:sldLayout>
 </file>
 
-<file path=ppt/slideLayouts/slideLayout12.xml><?xml version="1.0" encoding="utf-8"?>
+<file path=ppt/slideLayouts/slideLayout11.xml><?xml version="1.0" encoding="utf-8"?>
 <p:sldLayout xmlns:a="http://schemas.openxmlformats.org/drawingml/2006/main" xmlns:r="http://schemas.openxmlformats.org/officeDocument/2006/relationships" xmlns:mc="http://schemas.openxmlformats.org/markup-compatibility/2006" xmlns:mv="urn:schemas-microsoft-com:mac:vml" xmlns:p="http://schemas.openxmlformats.org/presentationml/2006/main" mc:Ignorable="mv" mc:PreserveAttributes="mv:*" type="vertTitleAndTx" preserve="1">
   <p:cSld name="Vertical Title and Text">
     <p:spTree>
@@ -937,8 +549,8 @@
         </p:nvSpPr>
         <p:spPr>
           <a:xfrm>
-            <a:off x="7369792" y="368301"/>
-            <a:ext cx="1524000" cy="5575300"/>
+            <a:off x="6629400" y="274638"/>
+            <a:ext cx="2057400" cy="5851525"/>
           </a:xfrm>
         </p:spPr>
         <p:txBody>
@@ -949,7 +561,7 @@
               <a:rPr lang="en-US" smtClean="0"/>
               <a:t>Click to edit Master title style</a:t>
             </a:r>
-            <a:endParaRPr/>
+            <a:endParaRPr lang="en-US"/>
           </a:p>
         </p:txBody>
       </p:sp>
@@ -965,8 +577,8 @@
         </p:nvSpPr>
         <p:spPr>
           <a:xfrm>
-            <a:off x="549274" y="368301"/>
-            <a:ext cx="6689726" cy="5575300"/>
+            <a:off x="457200" y="274638"/>
+            <a:ext cx="6019800" cy="5851525"/>
           </a:xfrm>
         </p:spPr>
         <p:txBody>
@@ -1006,7 +618,7 @@
               <a:rPr lang="en-US" smtClean="0"/>
               <a:t>Fifth level</a:t>
             </a:r>
-            <a:endParaRPr/>
+            <a:endParaRPr lang="en-US"/>
           </a:p>
         </p:txBody>
       </p:sp>
@@ -1027,7 +639,8 @@
           <a:p>
             <a:fld id="{C243C423-A908-1A4E-AAF6-CA2CF58F85BA}" type="datetimeFigureOut">
               <a:rPr lang="en-US" smtClean="0"/>
-              <a:t>10/18/15</a:t>
+              <a:pPr/>
+              <a:t>10/20/15</a:t>
             </a:fld>
             <a:endParaRPr lang="de-DE"/>
           </a:p>
@@ -1069,6 +682,7 @@
           <a:p>
             <a:fld id="{2E7E1A50-6DED-3042-A0E3-1B35F38C2747}" type="slidenum">
               <a:rPr lang="de-DE" smtClean="0"/>
+              <a:pPr/>
               <a:t>‹#›</a:t>
             </a:fld>
             <a:endParaRPr lang="de-DE"/>
@@ -1119,7 +733,7 @@
               <a:rPr lang="en-US" smtClean="0"/>
               <a:t>Click to edit Master title style</a:t>
             </a:r>
-            <a:endParaRPr/>
+            <a:endParaRPr lang="en-US"/>
           </a:p>
         </p:txBody>
       </p:sp>
@@ -1171,7 +785,7 @@
               <a:rPr lang="en-US" smtClean="0"/>
               <a:t>Fifth level</a:t>
             </a:r>
-            <a:endParaRPr/>
+            <a:endParaRPr lang="en-US"/>
           </a:p>
         </p:txBody>
       </p:sp>
@@ -1192,7 +806,8 @@
           <a:p>
             <a:fld id="{C243C423-A908-1A4E-AAF6-CA2CF58F85BA}" type="datetimeFigureOut">
               <a:rPr lang="en-US" smtClean="0"/>
-              <a:t>10/18/15</a:t>
+              <a:pPr/>
+              <a:t>10/20/15</a:t>
             </a:fld>
             <a:endParaRPr lang="de-DE"/>
           </a:p>
@@ -1234,6 +849,7 @@
           <a:p>
             <a:fld id="{2E7E1A50-6DED-3042-A0E3-1B35F38C2747}" type="slidenum">
               <a:rPr lang="de-DE" smtClean="0"/>
+              <a:pPr/>
               <a:t>‹#›</a:t>
             </a:fld>
             <a:endParaRPr lang="de-DE"/>
@@ -1249,325 +865,6 @@
 </file>
 
 <file path=ppt/slideLayouts/slideLayout3.xml><?xml version="1.0" encoding="utf-8"?>
-<p:sldLayout xmlns:a="http://schemas.openxmlformats.org/drawingml/2006/main" xmlns:r="http://schemas.openxmlformats.org/officeDocument/2006/relationships" xmlns:mc="http://schemas.openxmlformats.org/markup-compatibility/2006" xmlns:mv="urn:schemas-microsoft-com:mac:vml" xmlns:p="http://schemas.openxmlformats.org/presentationml/2006/main" mc:Ignorable="mv" mc:PreserveAttributes="mv:*" preserve="1">
-  <p:cSld name="Title Slide with Picture">
-    <p:spTree>
-      <p:nvGrpSpPr>
-        <p:cNvPr id="1" name=""/>
-        <p:cNvGrpSpPr/>
-        <p:nvPr/>
-      </p:nvGrpSpPr>
-      <p:grpSpPr>
-        <a:xfrm>
-          <a:off x="0" y="0"/>
-          <a:ext cx="0" cy="0"/>
-          <a:chOff x="0" y="0"/>
-          <a:chExt cx="0" cy="0"/>
-        </a:xfrm>
-      </p:grpSpPr>
-      <p:sp>
-        <p:nvSpPr>
-          <p:cNvPr id="2" name="Title 1"/>
-          <p:cNvSpPr>
-            <a:spLocks noGrp="1"/>
-          </p:cNvSpPr>
-          <p:nvPr>
-            <p:ph type="ctrTitle"/>
-          </p:nvPr>
-        </p:nvSpPr>
-        <p:spPr>
-          <a:xfrm>
-            <a:off x="363538" y="3352801"/>
-            <a:ext cx="8416925" cy="1470025"/>
-          </a:xfrm>
-        </p:spPr>
-        <p:txBody>
-          <a:bodyPr/>
-          <a:lstStyle/>
-          <a:p>
-            <a:r>
-              <a:rPr lang="en-US" smtClean="0"/>
-              <a:t>Click to edit Master title style</a:t>
-            </a:r>
-            <a:endParaRPr/>
-          </a:p>
-        </p:txBody>
-      </p:sp>
-      <p:sp>
-        <p:nvSpPr>
-          <p:cNvPr id="3" name="Subtitle 2"/>
-          <p:cNvSpPr>
-            <a:spLocks noGrp="1"/>
-          </p:cNvSpPr>
-          <p:nvPr>
-            <p:ph type="subTitle" idx="1"/>
-          </p:nvPr>
-        </p:nvSpPr>
-        <p:spPr>
-          <a:xfrm>
-            <a:off x="363538" y="4771029"/>
-            <a:ext cx="8416925" cy="972671"/>
-          </a:xfrm>
-        </p:spPr>
-        <p:txBody>
-          <a:bodyPr>
-            <a:normAutofit/>
-          </a:bodyPr>
-          <a:lstStyle>
-            <a:lvl1pPr marL="0" indent="0" algn="ctr">
-              <a:spcBef>
-                <a:spcPts val="300"/>
-              </a:spcBef>
-              <a:buNone/>
-              <a:defRPr sz="1800">
-                <a:solidFill>
-                  <a:schemeClr val="tx1">
-                    <a:tint val="75000"/>
-                  </a:schemeClr>
-                </a:solidFill>
-              </a:defRPr>
-            </a:lvl1pPr>
-            <a:lvl2pPr marL="457200" indent="0" algn="ctr">
-              <a:buNone/>
-              <a:defRPr>
-                <a:solidFill>
-                  <a:schemeClr val="tx1">
-                    <a:tint val="75000"/>
-                  </a:schemeClr>
-                </a:solidFill>
-              </a:defRPr>
-            </a:lvl2pPr>
-            <a:lvl3pPr marL="914400" indent="0" algn="ctr">
-              <a:buNone/>
-              <a:defRPr>
-                <a:solidFill>
-                  <a:schemeClr val="tx1">
-                    <a:tint val="75000"/>
-                  </a:schemeClr>
-                </a:solidFill>
-              </a:defRPr>
-            </a:lvl3pPr>
-            <a:lvl4pPr marL="1371600" indent="0" algn="ctr">
-              <a:buNone/>
-              <a:defRPr>
-                <a:solidFill>
-                  <a:schemeClr val="tx1">
-                    <a:tint val="75000"/>
-                  </a:schemeClr>
-                </a:solidFill>
-              </a:defRPr>
-            </a:lvl4pPr>
-            <a:lvl5pPr marL="1828800" indent="0" algn="ctr">
-              <a:buNone/>
-              <a:defRPr>
-                <a:solidFill>
-                  <a:schemeClr val="tx1">
-                    <a:tint val="75000"/>
-                  </a:schemeClr>
-                </a:solidFill>
-              </a:defRPr>
-            </a:lvl5pPr>
-            <a:lvl6pPr marL="2286000" indent="0" algn="ctr">
-              <a:buNone/>
-              <a:defRPr>
-                <a:solidFill>
-                  <a:schemeClr val="tx1">
-                    <a:tint val="75000"/>
-                  </a:schemeClr>
-                </a:solidFill>
-              </a:defRPr>
-            </a:lvl6pPr>
-            <a:lvl7pPr marL="2743200" indent="0" algn="ctr">
-              <a:buNone/>
-              <a:defRPr>
-                <a:solidFill>
-                  <a:schemeClr val="tx1">
-                    <a:tint val="75000"/>
-                  </a:schemeClr>
-                </a:solidFill>
-              </a:defRPr>
-            </a:lvl7pPr>
-            <a:lvl8pPr marL="3200400" indent="0" algn="ctr">
-              <a:buNone/>
-              <a:defRPr>
-                <a:solidFill>
-                  <a:schemeClr val="tx1">
-                    <a:tint val="75000"/>
-                  </a:schemeClr>
-                </a:solidFill>
-              </a:defRPr>
-            </a:lvl8pPr>
-            <a:lvl9pPr marL="3657600" indent="0" algn="ctr">
-              <a:buNone/>
-              <a:defRPr>
-                <a:solidFill>
-                  <a:schemeClr val="tx1">
-                    <a:tint val="75000"/>
-                  </a:schemeClr>
-                </a:solidFill>
-              </a:defRPr>
-            </a:lvl9pPr>
-          </a:lstStyle>
-          <a:p>
-            <a:r>
-              <a:rPr lang="en-US" smtClean="0"/>
-              <a:t>Click to edit Master subtitle style</a:t>
-            </a:r>
-            <a:endParaRPr/>
-          </a:p>
-        </p:txBody>
-      </p:sp>
-      <p:sp>
-        <p:nvSpPr>
-          <p:cNvPr id="4" name="Date Placeholder 3"/>
-          <p:cNvSpPr>
-            <a:spLocks noGrp="1"/>
-          </p:cNvSpPr>
-          <p:nvPr>
-            <p:ph type="dt" sz="half" idx="10"/>
-          </p:nvPr>
-        </p:nvSpPr>
-        <p:spPr/>
-        <p:txBody>
-          <a:bodyPr/>
-          <a:lstStyle/>
-          <a:p>
-            <a:fld id="{C243C423-A908-1A4E-AAF6-CA2CF58F85BA}" type="datetimeFigureOut">
-              <a:rPr lang="en-US" smtClean="0"/>
-              <a:t>10/18/15</a:t>
-            </a:fld>
-            <a:endParaRPr lang="de-DE"/>
-          </a:p>
-        </p:txBody>
-      </p:sp>
-      <p:sp>
-        <p:nvSpPr>
-          <p:cNvPr id="5" name="Footer Placeholder 4"/>
-          <p:cNvSpPr>
-            <a:spLocks noGrp="1"/>
-          </p:cNvSpPr>
-          <p:nvPr>
-            <p:ph type="ftr" sz="quarter" idx="11"/>
-          </p:nvPr>
-        </p:nvSpPr>
-        <p:spPr/>
-        <p:txBody>
-          <a:bodyPr/>
-          <a:lstStyle/>
-          <a:p>
-            <a:endParaRPr lang="de-DE"/>
-          </a:p>
-        </p:txBody>
-      </p:sp>
-      <p:sp>
-        <p:nvSpPr>
-          <p:cNvPr id="6" name="Slide Number Placeholder 5"/>
-          <p:cNvSpPr>
-            <a:spLocks noGrp="1"/>
-          </p:cNvSpPr>
-          <p:nvPr>
-            <p:ph type="sldNum" sz="quarter" idx="12"/>
-          </p:nvPr>
-        </p:nvSpPr>
-        <p:spPr/>
-        <p:txBody>
-          <a:bodyPr/>
-          <a:lstStyle/>
-          <a:p>
-            <a:fld id="{2E7E1A50-6DED-3042-A0E3-1B35F38C2747}" type="slidenum">
-              <a:rPr lang="de-DE" smtClean="0"/>
-              <a:t>‹#›</a:t>
-            </a:fld>
-            <a:endParaRPr lang="de-DE"/>
-          </a:p>
-        </p:txBody>
-      </p:sp>
-      <p:sp>
-        <p:nvSpPr>
-          <p:cNvPr id="9" name="Picture Placeholder 2"/>
-          <p:cNvSpPr>
-            <a:spLocks noGrp="1"/>
-          </p:cNvSpPr>
-          <p:nvPr>
-            <p:ph type="pic" idx="13"/>
-          </p:nvPr>
-        </p:nvSpPr>
-        <p:spPr>
-          <a:xfrm>
-            <a:off x="370980" y="363538"/>
-            <a:ext cx="8402040" cy="2836862"/>
-          </a:xfrm>
-          <a:ln w="3175">
-            <a:solidFill>
-              <a:schemeClr val="bg1"/>
-            </a:solidFill>
-          </a:ln>
-          <a:effectLst>
-            <a:outerShdw blurRad="63500" sx="100500" sy="100500" algn="ctr" rotWithShape="0">
-              <a:prstClr val="black">
-                <a:alpha val="50000"/>
-              </a:prstClr>
-            </a:outerShdw>
-          </a:effectLst>
-        </p:spPr>
-        <p:txBody>
-          <a:bodyPr/>
-          <a:lstStyle>
-            <a:lvl1pPr marL="0" indent="0">
-              <a:buNone/>
-              <a:defRPr sz="3200"/>
-            </a:lvl1pPr>
-            <a:lvl2pPr marL="457200" indent="0">
-              <a:buNone/>
-              <a:defRPr sz="2800"/>
-            </a:lvl2pPr>
-            <a:lvl3pPr marL="914400" indent="0">
-              <a:buNone/>
-              <a:defRPr sz="2400"/>
-            </a:lvl3pPr>
-            <a:lvl4pPr marL="1371600" indent="0">
-              <a:buNone/>
-              <a:defRPr sz="2000"/>
-            </a:lvl4pPr>
-            <a:lvl5pPr marL="1828800" indent="0">
-              <a:buNone/>
-              <a:defRPr sz="2000"/>
-            </a:lvl5pPr>
-            <a:lvl6pPr marL="2286000" indent="0">
-              <a:buNone/>
-              <a:defRPr sz="2000"/>
-            </a:lvl6pPr>
-            <a:lvl7pPr marL="2743200" indent="0">
-              <a:buNone/>
-              <a:defRPr sz="2000"/>
-            </a:lvl7pPr>
-            <a:lvl8pPr marL="3200400" indent="0">
-              <a:buNone/>
-              <a:defRPr sz="2000"/>
-            </a:lvl8pPr>
-            <a:lvl9pPr marL="3657600" indent="0">
-              <a:buNone/>
-              <a:defRPr sz="2000"/>
-            </a:lvl9pPr>
-          </a:lstStyle>
-          <a:p>
-            <a:r>
-              <a:rPr lang="en-US" smtClean="0"/>
-              <a:t>Click icon to add picture</a:t>
-            </a:r>
-            <a:endParaRPr/>
-          </a:p>
-        </p:txBody>
-      </p:sp>
-    </p:spTree>
-  </p:cSld>
-  <p:clrMapOvr>
-    <a:masterClrMapping/>
-  </p:clrMapOvr>
-</p:sldLayout>
-</file>
-
-<file path=ppt/slideLayouts/slideLayout4.xml><?xml version="1.0" encoding="utf-8"?>
 <p:sldLayout xmlns:a="http://schemas.openxmlformats.org/drawingml/2006/main" xmlns:r="http://schemas.openxmlformats.org/officeDocument/2006/relationships" xmlns:mc="http://schemas.openxmlformats.org/markup-compatibility/2006" xmlns:mv="urn:schemas-microsoft-com:mac:vml" xmlns:p="http://schemas.openxmlformats.org/presentationml/2006/main" mc:Ignorable="mv" mc:PreserveAttributes="mv:*" type="secHead" preserve="1">
   <p:cSld name="Section Header">
     <p:spTree>
@@ -1596,15 +893,15 @@
         </p:nvSpPr>
         <p:spPr>
           <a:xfrm>
-            <a:off x="549275" y="2403144"/>
-            <a:ext cx="8056563" cy="1362075"/>
+            <a:off x="722313" y="4406900"/>
+            <a:ext cx="7772400" cy="1362075"/>
           </a:xfrm>
         </p:spPr>
         <p:txBody>
-          <a:bodyPr anchor="b" anchorCtr="0"/>
+          <a:bodyPr anchor="t"/>
           <a:lstStyle>
-            <a:lvl1pPr algn="ctr">
-              <a:defRPr sz="4600" b="0" cap="none" baseline="0"/>
+            <a:lvl1pPr algn="l">
+              <a:defRPr sz="4000" b="1" cap="all"/>
             </a:lvl1pPr>
           </a:lstStyle>
           <a:p>
@@ -1612,7 +909,7 @@
               <a:rPr lang="en-US" smtClean="0"/>
               <a:t>Click to edit Master title style</a:t>
             </a:r>
-            <a:endParaRPr/>
+            <a:endParaRPr lang="en-US"/>
           </a:p>
         </p:txBody>
       </p:sp>
@@ -1628,21 +925,16 @@
         </p:nvSpPr>
         <p:spPr>
           <a:xfrm>
-            <a:off x="549275" y="3736005"/>
-            <a:ext cx="8056563" cy="1500187"/>
+            <a:off x="722313" y="2906713"/>
+            <a:ext cx="7772400" cy="1500187"/>
           </a:xfrm>
         </p:spPr>
         <p:txBody>
-          <a:bodyPr anchor="t" anchorCtr="0">
-            <a:normAutofit/>
-          </a:bodyPr>
+          <a:bodyPr anchor="b"/>
           <a:lstStyle>
-            <a:lvl1pPr marL="0" indent="0" algn="ctr">
-              <a:spcBef>
-                <a:spcPts val="300"/>
-              </a:spcBef>
-              <a:buNone/>
-              <a:defRPr sz="1800">
+            <a:lvl1pPr marL="0" indent="0">
+              <a:buNone/>
+              <a:defRPr sz="2000">
                 <a:solidFill>
                   <a:schemeClr val="tx1">
                     <a:tint val="75000"/>
@@ -1757,7 +1049,8 @@
           <a:p>
             <a:fld id="{C243C423-A908-1A4E-AAF6-CA2CF58F85BA}" type="datetimeFigureOut">
               <a:rPr lang="en-US" smtClean="0"/>
-              <a:t>10/18/15</a:t>
+              <a:pPr/>
+              <a:t>10/20/15</a:t>
             </a:fld>
             <a:endParaRPr lang="de-DE"/>
           </a:p>
@@ -1799,6 +1092,7 @@
           <a:p>
             <a:fld id="{2E7E1A50-6DED-3042-A0E3-1B35F38C2747}" type="slidenum">
               <a:rPr lang="de-DE" smtClean="0"/>
+              <a:pPr/>
               <a:t>‹#›</a:t>
             </a:fld>
             <a:endParaRPr lang="de-DE"/>
@@ -1813,7 +1107,7 @@
 </p:sldLayout>
 </file>
 
-<file path=ppt/slideLayouts/slideLayout5.xml><?xml version="1.0" encoding="utf-8"?>
+<file path=ppt/slideLayouts/slideLayout4.xml><?xml version="1.0" encoding="utf-8"?>
 <p:sldLayout xmlns:a="http://schemas.openxmlformats.org/drawingml/2006/main" xmlns:r="http://schemas.openxmlformats.org/officeDocument/2006/relationships" xmlns:mc="http://schemas.openxmlformats.org/markup-compatibility/2006" xmlns:mv="urn:schemas-microsoft-com:mac:vml" xmlns:p="http://schemas.openxmlformats.org/presentationml/2006/main" mc:Ignorable="mv" mc:PreserveAttributes="mv:*" type="twoObj" preserve="1">
   <p:cSld name="Two Content">
     <p:spTree>
@@ -1840,56 +1134,46 @@
             <p:ph type="title"/>
           </p:nvPr>
         </p:nvSpPr>
+        <p:spPr/>
+        <p:txBody>
+          <a:bodyPr/>
+          <a:lstStyle/>
+          <a:p>
+            <a:r>
+              <a:rPr lang="en-US" smtClean="0"/>
+              <a:t>Click to edit Master title style</a:t>
+            </a:r>
+            <a:endParaRPr lang="en-US"/>
+          </a:p>
+        </p:txBody>
+      </p:sp>
+      <p:sp>
+        <p:nvSpPr>
+          <p:cNvPr id="3" name="Content Placeholder 2"/>
+          <p:cNvSpPr>
+            <a:spLocks noGrp="1"/>
+          </p:cNvSpPr>
+          <p:nvPr>
+            <p:ph sz="half" idx="1"/>
+          </p:nvPr>
+        </p:nvSpPr>
         <p:spPr>
           <a:xfrm>
-            <a:off x="549275" y="107576"/>
-            <a:ext cx="8042276" cy="1336956"/>
+            <a:off x="457200" y="1600200"/>
+            <a:ext cx="4038600" cy="4525963"/>
           </a:xfrm>
         </p:spPr>
         <p:txBody>
           <a:bodyPr/>
-          <a:lstStyle/>
-          <a:p>
-            <a:r>
-              <a:rPr lang="en-US" smtClean="0"/>
-              <a:t>Click to edit Master title style</a:t>
-            </a:r>
-            <a:endParaRPr/>
-          </a:p>
-        </p:txBody>
-      </p:sp>
-      <p:sp>
-        <p:nvSpPr>
-          <p:cNvPr id="3" name="Content Placeholder 2"/>
-          <p:cNvSpPr>
-            <a:spLocks noGrp="1"/>
-          </p:cNvSpPr>
-          <p:nvPr>
-            <p:ph sz="half" idx="1"/>
-          </p:nvPr>
-        </p:nvSpPr>
-        <p:spPr>
-          <a:xfrm>
-            <a:off x="549275" y="1600201"/>
-            <a:ext cx="3840480" cy="4343400"/>
-          </a:xfrm>
-        </p:spPr>
-        <p:txBody>
-          <a:bodyPr>
-            <a:normAutofit/>
-          </a:bodyPr>
           <a:lstStyle>
             <a:lvl1pPr>
-              <a:spcBef>
-                <a:spcPts val="1600"/>
-              </a:spcBef>
-              <a:defRPr sz="2000"/>
+              <a:defRPr sz="2800"/>
             </a:lvl1pPr>
             <a:lvl2pPr>
-              <a:defRPr sz="1800"/>
+              <a:defRPr sz="2400"/>
             </a:lvl2pPr>
             <a:lvl3pPr>
-              <a:defRPr sz="1800"/>
+              <a:defRPr sz="2000"/>
             </a:lvl3pPr>
             <a:lvl4pPr>
               <a:defRPr sz="1800"/>
@@ -1944,7 +1228,7 @@
               <a:rPr lang="en-US" smtClean="0"/>
               <a:t>Fifth level</a:t>
             </a:r>
-            <a:endParaRPr/>
+            <a:endParaRPr lang="en-US"/>
           </a:p>
         </p:txBody>
       </p:sp>
@@ -1960,26 +1244,21 @@
         </p:nvSpPr>
         <p:spPr>
           <a:xfrm>
-            <a:off x="4751071" y="1600201"/>
-            <a:ext cx="3840480" cy="4343400"/>
+            <a:off x="4648200" y="1600200"/>
+            <a:ext cx="4038600" cy="4525963"/>
           </a:xfrm>
         </p:spPr>
         <p:txBody>
-          <a:bodyPr>
-            <a:normAutofit/>
-          </a:bodyPr>
+          <a:bodyPr/>
           <a:lstStyle>
             <a:lvl1pPr>
-              <a:spcBef>
-                <a:spcPts val="1600"/>
-              </a:spcBef>
-              <a:defRPr sz="2000"/>
+              <a:defRPr sz="2800"/>
             </a:lvl1pPr>
             <a:lvl2pPr>
-              <a:defRPr sz="1800"/>
+              <a:defRPr sz="2400"/>
             </a:lvl2pPr>
             <a:lvl3pPr>
-              <a:defRPr sz="1800"/>
+              <a:defRPr sz="2000"/>
             </a:lvl3pPr>
             <a:lvl4pPr>
               <a:defRPr sz="1800"/>
@@ -2034,7 +1313,7 @@
               <a:rPr lang="en-US" smtClean="0"/>
               <a:t>Fifth level</a:t>
             </a:r>
-            <a:endParaRPr/>
+            <a:endParaRPr lang="en-US"/>
           </a:p>
         </p:txBody>
       </p:sp>
@@ -2055,7 +1334,8 @@
           <a:p>
             <a:fld id="{C243C423-A908-1A4E-AAF6-CA2CF58F85BA}" type="datetimeFigureOut">
               <a:rPr lang="en-US" smtClean="0"/>
-              <a:t>10/18/15</a:t>
+              <a:pPr/>
+              <a:t>10/20/15</a:t>
             </a:fld>
             <a:endParaRPr lang="de-DE"/>
           </a:p>
@@ -2097,6 +1377,7 @@
           <a:p>
             <a:fld id="{2E7E1A50-6DED-3042-A0E3-1B35F38C2747}" type="slidenum">
               <a:rPr lang="de-DE" smtClean="0"/>
+              <a:pPr/>
               <a:t>‹#›</a:t>
             </a:fld>
             <a:endParaRPr lang="de-DE"/>
@@ -2111,7 +1392,7 @@
 </p:sldLayout>
 </file>
 
-<file path=ppt/slideLayouts/slideLayout6.xml><?xml version="1.0" encoding="utf-8"?>
+<file path=ppt/slideLayouts/slideLayout5.xml><?xml version="1.0" encoding="utf-8"?>
 <p:sldLayout xmlns:a="http://schemas.openxmlformats.org/drawingml/2006/main" xmlns:r="http://schemas.openxmlformats.org/officeDocument/2006/relationships" xmlns:mc="http://schemas.openxmlformats.org/markup-compatibility/2006" xmlns:mv="urn:schemas-microsoft-com:mac:vml" xmlns:p="http://schemas.openxmlformats.org/presentationml/2006/main" mc:Ignorable="mv" mc:PreserveAttributes="mv:*" type="twoTxTwoObj" preserve="1">
   <p:cSld name="Comparison">
     <p:spTree>
@@ -2138,12 +1419,7 @@
             <p:ph type="title"/>
           </p:nvPr>
         </p:nvSpPr>
-        <p:spPr>
-          <a:xfrm>
-            <a:off x="549274" y="107576"/>
-            <a:ext cx="8042276" cy="1336956"/>
-          </a:xfrm>
-        </p:spPr>
+        <p:spPr/>
         <p:txBody>
           <a:bodyPr/>
           <a:lstStyle>
@@ -2156,7 +1432,7 @@
               <a:rPr lang="en-US" smtClean="0"/>
               <a:t>Click to edit Master title style</a:t>
             </a:r>
-            <a:endParaRPr/>
+            <a:endParaRPr lang="en-US"/>
           </a:p>
         </p:txBody>
       </p:sp>
@@ -2172,28 +1448,16 @@
         </p:nvSpPr>
         <p:spPr>
           <a:xfrm>
-            <a:off x="549274" y="1453224"/>
-            <a:ext cx="3840480" cy="750887"/>
+            <a:off x="457200" y="1535113"/>
+            <a:ext cx="4040188" cy="639762"/>
           </a:xfrm>
         </p:spPr>
         <p:txBody>
-          <a:bodyPr anchor="b">
-            <a:noAutofit/>
-          </a:bodyPr>
+          <a:bodyPr anchor="b"/>
           <a:lstStyle>
-            <a:lvl1pPr marL="0" indent="0" algn="ctr">
-              <a:spcBef>
-                <a:spcPts val="0"/>
-              </a:spcBef>
-              <a:buNone/>
-              <a:defRPr sz="2400" b="0">
-                <a:solidFill>
-                  <a:schemeClr val="accent1">
-                    <a:lumMod val="60000"/>
-                    <a:lumOff val="40000"/>
-                  </a:schemeClr>
-                </a:solidFill>
-              </a:defRPr>
+            <a:lvl1pPr marL="0" indent="0">
+              <a:buNone/>
+              <a:defRPr sz="2400" b="1"/>
             </a:lvl1pPr>
             <a:lvl2pPr marL="457200" indent="0">
               <a:buNone/>
@@ -2249,32 +1513,27 @@
         </p:nvSpPr>
         <p:spPr>
           <a:xfrm>
-            <a:off x="549274" y="2347415"/>
-            <a:ext cx="3840480" cy="3596185"/>
+            <a:off x="457200" y="2174875"/>
+            <a:ext cx="4040188" cy="3951288"/>
           </a:xfrm>
         </p:spPr>
         <p:txBody>
-          <a:bodyPr>
-            <a:normAutofit/>
-          </a:bodyPr>
+          <a:bodyPr/>
           <a:lstStyle>
             <a:lvl1pPr>
-              <a:spcBef>
-                <a:spcPts val="1600"/>
-              </a:spcBef>
-              <a:defRPr sz="2000"/>
+              <a:defRPr sz="2400"/>
             </a:lvl1pPr>
             <a:lvl2pPr>
-              <a:defRPr sz="1800"/>
+              <a:defRPr sz="2000"/>
             </a:lvl2pPr>
             <a:lvl3pPr>
               <a:defRPr sz="1800"/>
             </a:lvl3pPr>
             <a:lvl4pPr>
-              <a:defRPr sz="1800"/>
+              <a:defRPr sz="1600"/>
             </a:lvl4pPr>
             <a:lvl5pPr>
-              <a:defRPr sz="1800"/>
+              <a:defRPr sz="1600"/>
             </a:lvl5pPr>
             <a:lvl6pPr>
               <a:defRPr sz="1600"/>
@@ -2323,7 +1582,7 @@
               <a:rPr lang="en-US" smtClean="0"/>
               <a:t>Fifth level</a:t>
             </a:r>
-            <a:endParaRPr/>
+            <a:endParaRPr lang="en-US"/>
           </a:p>
         </p:txBody>
       </p:sp>
@@ -2339,28 +1598,16 @@
         </p:nvSpPr>
         <p:spPr>
           <a:xfrm>
-            <a:off x="4751070" y="1453224"/>
-            <a:ext cx="3840480" cy="750887"/>
+            <a:off x="4645025" y="1535113"/>
+            <a:ext cx="4041775" cy="639762"/>
           </a:xfrm>
         </p:spPr>
         <p:txBody>
-          <a:bodyPr anchor="b">
-            <a:noAutofit/>
-          </a:bodyPr>
+          <a:bodyPr anchor="b"/>
           <a:lstStyle>
-            <a:lvl1pPr marL="0" indent="0" algn="ctr">
-              <a:spcBef>
-                <a:spcPts val="0"/>
-              </a:spcBef>
-              <a:buNone/>
-              <a:defRPr sz="2400" b="0">
-                <a:solidFill>
-                  <a:schemeClr val="accent1">
-                    <a:lumMod val="60000"/>
-                    <a:lumOff val="40000"/>
-                  </a:schemeClr>
-                </a:solidFill>
-              </a:defRPr>
+            <a:lvl1pPr marL="0" indent="0">
+              <a:buNone/>
+              <a:defRPr sz="2400" b="1"/>
             </a:lvl1pPr>
             <a:lvl2pPr marL="457200" indent="0">
               <a:buNone/>
@@ -2416,32 +1663,27 @@
         </p:nvSpPr>
         <p:spPr>
           <a:xfrm>
-            <a:off x="4751070" y="2347415"/>
-            <a:ext cx="3840480" cy="3596185"/>
+            <a:off x="4645025" y="2174875"/>
+            <a:ext cx="4041775" cy="3951288"/>
           </a:xfrm>
         </p:spPr>
         <p:txBody>
-          <a:bodyPr>
-            <a:normAutofit/>
-          </a:bodyPr>
+          <a:bodyPr/>
           <a:lstStyle>
             <a:lvl1pPr>
-              <a:spcBef>
-                <a:spcPts val="1600"/>
-              </a:spcBef>
-              <a:defRPr sz="2000"/>
+              <a:defRPr sz="2400"/>
             </a:lvl1pPr>
             <a:lvl2pPr>
-              <a:defRPr sz="1800"/>
+              <a:defRPr sz="2000"/>
             </a:lvl2pPr>
             <a:lvl3pPr>
               <a:defRPr sz="1800"/>
             </a:lvl3pPr>
             <a:lvl4pPr>
-              <a:defRPr sz="1800"/>
+              <a:defRPr sz="1600"/>
             </a:lvl4pPr>
             <a:lvl5pPr>
-              <a:defRPr sz="1800"/>
+              <a:defRPr sz="1600"/>
             </a:lvl5pPr>
             <a:lvl6pPr>
               <a:defRPr sz="1600"/>
@@ -2490,7 +1732,7 @@
               <a:rPr lang="en-US" smtClean="0"/>
               <a:t>Fifth level</a:t>
             </a:r>
-            <a:endParaRPr/>
+            <a:endParaRPr lang="en-US"/>
           </a:p>
         </p:txBody>
       </p:sp>
@@ -2511,7 +1753,8 @@
           <a:p>
             <a:fld id="{C243C423-A908-1A4E-AAF6-CA2CF58F85BA}" type="datetimeFigureOut">
               <a:rPr lang="en-US" smtClean="0"/>
-              <a:t>10/18/15</a:t>
+              <a:pPr/>
+              <a:t>10/20/15</a:t>
             </a:fld>
             <a:endParaRPr lang="de-DE"/>
           </a:p>
@@ -2553,6 +1796,7 @@
           <a:p>
             <a:fld id="{2E7E1A50-6DED-3042-A0E3-1B35F38C2747}" type="slidenum">
               <a:rPr lang="de-DE" smtClean="0"/>
+              <a:pPr/>
               <a:t>‹#›</a:t>
             </a:fld>
             <a:endParaRPr lang="de-DE"/>
@@ -2567,7 +1811,7 @@
 </p:sldLayout>
 </file>
 
-<file path=ppt/slideLayouts/slideLayout7.xml><?xml version="1.0" encoding="utf-8"?>
+<file path=ppt/slideLayouts/slideLayout6.xml><?xml version="1.0" encoding="utf-8"?>
 <p:sldLayout xmlns:a="http://schemas.openxmlformats.org/drawingml/2006/main" xmlns:r="http://schemas.openxmlformats.org/officeDocument/2006/relationships" xmlns:mc="http://schemas.openxmlformats.org/markup-compatibility/2006" xmlns:mv="urn:schemas-microsoft-com:mac:vml" xmlns:p="http://schemas.openxmlformats.org/presentationml/2006/main" mc:Ignorable="mv" mc:PreserveAttributes="mv:*" type="titleOnly" preserve="1">
   <p:cSld name="Title Only">
     <p:spTree>
@@ -2603,7 +1847,7 @@
               <a:rPr lang="en-US" smtClean="0"/>
               <a:t>Click to edit Master title style</a:t>
             </a:r>
-            <a:endParaRPr/>
+            <a:endParaRPr lang="en-US"/>
           </a:p>
         </p:txBody>
       </p:sp>
@@ -2624,7 +1868,8 @@
           <a:p>
             <a:fld id="{C243C423-A908-1A4E-AAF6-CA2CF58F85BA}" type="datetimeFigureOut">
               <a:rPr lang="en-US" smtClean="0"/>
-              <a:t>10/18/15</a:t>
+              <a:pPr/>
+              <a:t>10/20/15</a:t>
             </a:fld>
             <a:endParaRPr lang="de-DE"/>
           </a:p>
@@ -2666,6 +1911,7 @@
           <a:p>
             <a:fld id="{2E7E1A50-6DED-3042-A0E3-1B35F38C2747}" type="slidenum">
               <a:rPr lang="de-DE" smtClean="0"/>
+              <a:pPr/>
               <a:t>‹#›</a:t>
             </a:fld>
             <a:endParaRPr lang="de-DE"/>
@@ -2680,7 +1926,7 @@
 </p:sldLayout>
 </file>
 
-<file path=ppt/slideLayouts/slideLayout8.xml><?xml version="1.0" encoding="utf-8"?>
+<file path=ppt/slideLayouts/slideLayout7.xml><?xml version="1.0" encoding="utf-8"?>
 <p:sldLayout xmlns:a="http://schemas.openxmlformats.org/drawingml/2006/main" xmlns:r="http://schemas.openxmlformats.org/officeDocument/2006/relationships" xmlns:mc="http://schemas.openxmlformats.org/markup-compatibility/2006" xmlns:mv="urn:schemas-microsoft-com:mac:vml" xmlns:p="http://schemas.openxmlformats.org/presentationml/2006/main" mc:Ignorable="mv" mc:PreserveAttributes="mv:*" type="blank" preserve="1">
   <p:cSld name="Blank">
     <p:spTree>
@@ -2714,7 +1960,8 @@
           <a:p>
             <a:fld id="{C243C423-A908-1A4E-AAF6-CA2CF58F85BA}" type="datetimeFigureOut">
               <a:rPr lang="en-US" smtClean="0"/>
-              <a:t>10/18/15</a:t>
+              <a:pPr/>
+              <a:t>10/20/15</a:t>
             </a:fld>
             <a:endParaRPr lang="de-DE"/>
           </a:p>
@@ -2756,6 +2003,7 @@
           <a:p>
             <a:fld id="{2E7E1A50-6DED-3042-A0E3-1B35F38C2747}" type="slidenum">
               <a:rPr lang="de-DE" smtClean="0"/>
+              <a:pPr/>
               <a:t>‹#›</a:t>
             </a:fld>
             <a:endParaRPr lang="de-DE"/>
@@ -2770,7 +2018,7 @@
 </p:sldLayout>
 </file>
 
-<file path=ppt/slideLayouts/slideLayout9.xml><?xml version="1.0" encoding="utf-8"?>
+<file path=ppt/slideLayouts/slideLayout8.xml><?xml version="1.0" encoding="utf-8"?>
 <p:sldLayout xmlns:a="http://schemas.openxmlformats.org/drawingml/2006/main" xmlns:r="http://schemas.openxmlformats.org/officeDocument/2006/relationships" xmlns:mc="http://schemas.openxmlformats.org/markup-compatibility/2006" xmlns:mv="urn:schemas-microsoft-com:mac:vml" xmlns:p="http://schemas.openxmlformats.org/presentationml/2006/main" mc:Ignorable="mv" mc:PreserveAttributes="mv:*" type="objTx" preserve="1">
   <p:cSld name="Content with Caption">
     <p:spTree>
@@ -2799,15 +2047,15 @@
         </p:nvSpPr>
         <p:spPr>
           <a:xfrm>
-            <a:off x="533399" y="611872"/>
-            <a:ext cx="3840480" cy="1162050"/>
+            <a:off x="457200" y="273050"/>
+            <a:ext cx="3008313" cy="1162050"/>
           </a:xfrm>
         </p:spPr>
         <p:txBody>
           <a:bodyPr anchor="b"/>
           <a:lstStyle>
-            <a:lvl1pPr algn="ctr">
-              <a:defRPr sz="3600" b="0"/>
+            <a:lvl1pPr algn="l">
+              <a:defRPr sz="2000" b="1"/>
             </a:lvl1pPr>
           </a:lstStyle>
           <a:p>
@@ -2815,7 +2063,7 @@
               <a:rPr lang="en-US" smtClean="0"/>
               <a:t>Click to edit Master title style</a:t>
             </a:r>
-            <a:endParaRPr/>
+            <a:endParaRPr lang="en-US"/>
           </a:p>
         </p:txBody>
       </p:sp>
@@ -2831,32 +2079,27 @@
         </p:nvSpPr>
         <p:spPr>
           <a:xfrm>
-            <a:off x="4742824" y="368300"/>
-            <a:ext cx="3840480" cy="5575300"/>
+            <a:off x="3575050" y="273050"/>
+            <a:ext cx="5111750" cy="5853113"/>
           </a:xfrm>
         </p:spPr>
         <p:txBody>
-          <a:bodyPr>
-            <a:normAutofit/>
-          </a:bodyPr>
+          <a:bodyPr/>
           <a:lstStyle>
             <a:lvl1pPr>
-              <a:spcBef>
-                <a:spcPts val="2000"/>
-              </a:spcBef>
-              <a:defRPr sz="2200"/>
+              <a:defRPr sz="3200"/>
             </a:lvl1pPr>
             <a:lvl2pPr>
-              <a:defRPr sz="2000"/>
+              <a:defRPr sz="2800"/>
             </a:lvl2pPr>
             <a:lvl3pPr>
-              <a:defRPr sz="1800"/>
+              <a:defRPr sz="2400"/>
             </a:lvl3pPr>
             <a:lvl4pPr>
-              <a:defRPr sz="1800"/>
+              <a:defRPr sz="2000"/>
             </a:lvl4pPr>
             <a:lvl5pPr>
-              <a:defRPr sz="1800"/>
+              <a:defRPr sz="2000"/>
             </a:lvl5pPr>
             <a:lvl6pPr>
               <a:defRPr sz="2000"/>
@@ -2905,7 +2148,7 @@
               <a:rPr lang="en-US" smtClean="0"/>
               <a:t>Fifth level</a:t>
             </a:r>
-            <a:endParaRPr/>
+            <a:endParaRPr lang="en-US"/>
           </a:p>
         </p:txBody>
       </p:sp>
@@ -2921,18 +2164,16 @@
         </p:nvSpPr>
         <p:spPr>
           <a:xfrm>
-            <a:off x="533399" y="1787856"/>
-            <a:ext cx="3840480" cy="3720152"/>
+            <a:off x="457200" y="1435100"/>
+            <a:ext cx="3008313" cy="4691063"/>
           </a:xfrm>
         </p:spPr>
         <p:txBody>
-          <a:bodyPr>
-            <a:normAutofit/>
-          </a:bodyPr>
+          <a:bodyPr/>
           <a:lstStyle>
-            <a:lvl1pPr marL="0" indent="0" algn="ctr">
-              <a:buNone/>
-              <a:defRPr sz="1800"/>
+            <a:lvl1pPr marL="0" indent="0">
+              <a:buNone/>
+              <a:defRPr sz="1400"/>
             </a:lvl1pPr>
             <a:lvl2pPr marL="457200" indent="0">
               <a:buNone/>
@@ -2993,7 +2234,8 @@
           <a:p>
             <a:fld id="{C243C423-A908-1A4E-AAF6-CA2CF58F85BA}" type="datetimeFigureOut">
               <a:rPr lang="en-US" smtClean="0"/>
-              <a:t>10/18/15</a:t>
+              <a:pPr/>
+              <a:t>10/20/15</a:t>
             </a:fld>
             <a:endParaRPr lang="de-DE"/>
           </a:p>
@@ -3035,6 +2277,261 @@
           <a:p>
             <a:fld id="{2E7E1A50-6DED-3042-A0E3-1B35F38C2747}" type="slidenum">
               <a:rPr lang="de-DE" smtClean="0"/>
+              <a:pPr/>
+              <a:t>‹#›</a:t>
+            </a:fld>
+            <a:endParaRPr lang="de-DE"/>
+          </a:p>
+        </p:txBody>
+      </p:sp>
+    </p:spTree>
+  </p:cSld>
+  <p:clrMapOvr>
+    <a:masterClrMapping/>
+  </p:clrMapOvr>
+</p:sldLayout>
+</file>
+
+<file path=ppt/slideLayouts/slideLayout9.xml><?xml version="1.0" encoding="utf-8"?>
+<p:sldLayout xmlns:a="http://schemas.openxmlformats.org/drawingml/2006/main" xmlns:r="http://schemas.openxmlformats.org/officeDocument/2006/relationships" xmlns:mc="http://schemas.openxmlformats.org/markup-compatibility/2006" xmlns:mv="urn:schemas-microsoft-com:mac:vml" xmlns:p="http://schemas.openxmlformats.org/presentationml/2006/main" mc:Ignorable="mv" mc:PreserveAttributes="mv:*" type="picTx" preserve="1">
+  <p:cSld name="Picture with Caption">
+    <p:spTree>
+      <p:nvGrpSpPr>
+        <p:cNvPr id="1" name=""/>
+        <p:cNvGrpSpPr/>
+        <p:nvPr/>
+      </p:nvGrpSpPr>
+      <p:grpSpPr>
+        <a:xfrm>
+          <a:off x="0" y="0"/>
+          <a:ext cx="0" cy="0"/>
+          <a:chOff x="0" y="0"/>
+          <a:chExt cx="0" cy="0"/>
+        </a:xfrm>
+      </p:grpSpPr>
+      <p:sp>
+        <p:nvSpPr>
+          <p:cNvPr id="2" name="Title 1"/>
+          <p:cNvSpPr>
+            <a:spLocks noGrp="1"/>
+          </p:cNvSpPr>
+          <p:nvPr>
+            <p:ph type="title"/>
+          </p:nvPr>
+        </p:nvSpPr>
+        <p:spPr>
+          <a:xfrm>
+            <a:off x="1792288" y="4800600"/>
+            <a:ext cx="5486400" cy="566738"/>
+          </a:xfrm>
+        </p:spPr>
+        <p:txBody>
+          <a:bodyPr anchor="b"/>
+          <a:lstStyle>
+            <a:lvl1pPr algn="l">
+              <a:defRPr sz="2000" b="1"/>
+            </a:lvl1pPr>
+          </a:lstStyle>
+          <a:p>
+            <a:r>
+              <a:rPr lang="en-US" smtClean="0"/>
+              <a:t>Click to edit Master title style</a:t>
+            </a:r>
+            <a:endParaRPr lang="en-US"/>
+          </a:p>
+        </p:txBody>
+      </p:sp>
+      <p:sp>
+        <p:nvSpPr>
+          <p:cNvPr id="3" name="Picture Placeholder 2"/>
+          <p:cNvSpPr>
+            <a:spLocks noGrp="1"/>
+          </p:cNvSpPr>
+          <p:nvPr>
+            <p:ph type="pic" idx="1"/>
+          </p:nvPr>
+        </p:nvSpPr>
+        <p:spPr>
+          <a:xfrm>
+            <a:off x="1792288" y="612775"/>
+            <a:ext cx="5486400" cy="4114800"/>
+          </a:xfrm>
+        </p:spPr>
+        <p:txBody>
+          <a:bodyPr/>
+          <a:lstStyle>
+            <a:lvl1pPr marL="0" indent="0">
+              <a:buNone/>
+              <a:defRPr sz="3200"/>
+            </a:lvl1pPr>
+            <a:lvl2pPr marL="457200" indent="0">
+              <a:buNone/>
+              <a:defRPr sz="2800"/>
+            </a:lvl2pPr>
+            <a:lvl3pPr marL="914400" indent="0">
+              <a:buNone/>
+              <a:defRPr sz="2400"/>
+            </a:lvl3pPr>
+            <a:lvl4pPr marL="1371600" indent="0">
+              <a:buNone/>
+              <a:defRPr sz="2000"/>
+            </a:lvl4pPr>
+            <a:lvl5pPr marL="1828800" indent="0">
+              <a:buNone/>
+              <a:defRPr sz="2000"/>
+            </a:lvl5pPr>
+            <a:lvl6pPr marL="2286000" indent="0">
+              <a:buNone/>
+              <a:defRPr sz="2000"/>
+            </a:lvl6pPr>
+            <a:lvl7pPr marL="2743200" indent="0">
+              <a:buNone/>
+              <a:defRPr sz="2000"/>
+            </a:lvl7pPr>
+            <a:lvl8pPr marL="3200400" indent="0">
+              <a:buNone/>
+              <a:defRPr sz="2000"/>
+            </a:lvl8pPr>
+            <a:lvl9pPr marL="3657600" indent="0">
+              <a:buNone/>
+              <a:defRPr sz="2000"/>
+            </a:lvl9pPr>
+          </a:lstStyle>
+          <a:p>
+            <a:r>
+              <a:rPr lang="en-US" smtClean="0"/>
+              <a:t>Click icon to add picture</a:t>
+            </a:r>
+            <a:endParaRPr lang="en-US"/>
+          </a:p>
+        </p:txBody>
+      </p:sp>
+      <p:sp>
+        <p:nvSpPr>
+          <p:cNvPr id="4" name="Text Placeholder 3"/>
+          <p:cNvSpPr>
+            <a:spLocks noGrp="1"/>
+          </p:cNvSpPr>
+          <p:nvPr>
+            <p:ph type="body" sz="half" idx="2"/>
+          </p:nvPr>
+        </p:nvSpPr>
+        <p:spPr>
+          <a:xfrm>
+            <a:off x="1792288" y="5367338"/>
+            <a:ext cx="5486400" cy="804862"/>
+          </a:xfrm>
+        </p:spPr>
+        <p:txBody>
+          <a:bodyPr/>
+          <a:lstStyle>
+            <a:lvl1pPr marL="0" indent="0">
+              <a:buNone/>
+              <a:defRPr sz="1400"/>
+            </a:lvl1pPr>
+            <a:lvl2pPr marL="457200" indent="0">
+              <a:buNone/>
+              <a:defRPr sz="1200"/>
+            </a:lvl2pPr>
+            <a:lvl3pPr marL="914400" indent="0">
+              <a:buNone/>
+              <a:defRPr sz="1000"/>
+            </a:lvl3pPr>
+            <a:lvl4pPr marL="1371600" indent="0">
+              <a:buNone/>
+              <a:defRPr sz="900"/>
+            </a:lvl4pPr>
+            <a:lvl5pPr marL="1828800" indent="0">
+              <a:buNone/>
+              <a:defRPr sz="900"/>
+            </a:lvl5pPr>
+            <a:lvl6pPr marL="2286000" indent="0">
+              <a:buNone/>
+              <a:defRPr sz="900"/>
+            </a:lvl6pPr>
+            <a:lvl7pPr marL="2743200" indent="0">
+              <a:buNone/>
+              <a:defRPr sz="900"/>
+            </a:lvl7pPr>
+            <a:lvl8pPr marL="3200400" indent="0">
+              <a:buNone/>
+              <a:defRPr sz="900"/>
+            </a:lvl8pPr>
+            <a:lvl9pPr marL="3657600" indent="0">
+              <a:buNone/>
+              <a:defRPr sz="900"/>
+            </a:lvl9pPr>
+          </a:lstStyle>
+          <a:p>
+            <a:pPr lvl="0"/>
+            <a:r>
+              <a:rPr lang="en-US" smtClean="0"/>
+              <a:t>Click to edit Master text styles</a:t>
+            </a:r>
+          </a:p>
+        </p:txBody>
+      </p:sp>
+      <p:sp>
+        <p:nvSpPr>
+          <p:cNvPr id="5" name="Date Placeholder 4"/>
+          <p:cNvSpPr>
+            <a:spLocks noGrp="1"/>
+          </p:cNvSpPr>
+          <p:nvPr>
+            <p:ph type="dt" sz="half" idx="10"/>
+          </p:nvPr>
+        </p:nvSpPr>
+        <p:spPr/>
+        <p:txBody>
+          <a:bodyPr/>
+          <a:lstStyle/>
+          <a:p>
+            <a:fld id="{C243C423-A908-1A4E-AAF6-CA2CF58F85BA}" type="datetimeFigureOut">
+              <a:rPr lang="en-US" smtClean="0"/>
+              <a:pPr/>
+              <a:t>10/20/15</a:t>
+            </a:fld>
+            <a:endParaRPr lang="de-DE"/>
+          </a:p>
+        </p:txBody>
+      </p:sp>
+      <p:sp>
+        <p:nvSpPr>
+          <p:cNvPr id="6" name="Footer Placeholder 5"/>
+          <p:cNvSpPr>
+            <a:spLocks noGrp="1"/>
+          </p:cNvSpPr>
+          <p:nvPr>
+            <p:ph type="ftr" sz="quarter" idx="11"/>
+          </p:nvPr>
+        </p:nvSpPr>
+        <p:spPr/>
+        <p:txBody>
+          <a:bodyPr/>
+          <a:lstStyle/>
+          <a:p>
+            <a:endParaRPr lang="de-DE"/>
+          </a:p>
+        </p:txBody>
+      </p:sp>
+      <p:sp>
+        <p:nvSpPr>
+          <p:cNvPr id="7" name="Slide Number Placeholder 6"/>
+          <p:cNvSpPr>
+            <a:spLocks noGrp="1"/>
+          </p:cNvSpPr>
+          <p:nvPr>
+            <p:ph type="sldNum" sz="quarter" idx="12"/>
+          </p:nvPr>
+        </p:nvSpPr>
+        <p:spPr/>
+        <p:txBody>
+          <a:bodyPr/>
+          <a:lstStyle/>
+          <a:p>
+            <a:fld id="{2E7E1A50-6DED-3042-A0E3-1B35F38C2747}" type="slidenum">
+              <a:rPr lang="de-DE" smtClean="0"/>
+              <a:pPr/>
               <a:t>‹#›</a:t>
             </a:fld>
             <a:endParaRPr lang="de-DE"/>
@@ -3053,9 +2550,16 @@
 <p:sldMaster xmlns:a="http://schemas.openxmlformats.org/drawingml/2006/main" xmlns:r="http://schemas.openxmlformats.org/officeDocument/2006/relationships" xmlns:mc="http://schemas.openxmlformats.org/markup-compatibility/2006" xmlns:mv="urn:schemas-microsoft-com:mac:vml" xmlns:p="http://schemas.openxmlformats.org/presentationml/2006/main" mc:Ignorable="mv" mc:PreserveAttributes="mv:*">
   <p:cSld>
     <p:bg>
-      <p:bgRef idx="1003">
-        <a:schemeClr val="bg2"/>
-      </p:bgRef>
+      <p:bgPr>
+        <a:blipFill dpi="0" rotWithShape="1">
+          <a:blip r:embed="rId13"/>
+          <a:srcRect/>
+          <a:stretch>
+            <a:fillRect/>
+          </a:stretch>
+        </a:blipFill>
+        <a:effectLst/>
+      </p:bgPr>
     </p:bg>
     <p:spTree>
       <p:nvGrpSpPr>
@@ -3083,16 +2587,16 @@
         </p:nvSpPr>
         <p:spPr>
           <a:xfrm>
-            <a:off x="549275" y="107576"/>
-            <a:ext cx="8042276" cy="1336956"/>
+            <a:off x="457200" y="274638"/>
+            <a:ext cx="8229600" cy="1143000"/>
           </a:xfrm>
           <a:prstGeom prst="rect">
             <a:avLst/>
           </a:prstGeom>
         </p:spPr>
         <p:txBody>
-          <a:bodyPr vert="horz" lIns="91440" tIns="45720" rIns="91440" bIns="45720" rtlCol="0" anchor="b" anchorCtr="0">
-            <a:noAutofit/>
+          <a:bodyPr vert="horz" lIns="91440" tIns="45720" rIns="91440" bIns="45720" rtlCol="0" anchor="ctr">
+            <a:normAutofit/>
           </a:bodyPr>
           <a:lstStyle/>
           <a:p>
@@ -3100,7 +2604,7 @@
               <a:rPr lang="en-US" smtClean="0"/>
               <a:t>Click to edit Master title style</a:t>
             </a:r>
-            <a:endParaRPr/>
+            <a:endParaRPr lang="en-US"/>
           </a:p>
         </p:txBody>
       </p:sp>
@@ -3116,8 +2620,8 @@
         </p:nvSpPr>
         <p:spPr>
           <a:xfrm>
-            <a:off x="549275" y="1600201"/>
-            <a:ext cx="8042276" cy="4343400"/>
+            <a:off x="457200" y="1600200"/>
+            <a:ext cx="8229600" cy="4525963"/>
           </a:xfrm>
           <a:prstGeom prst="rect">
             <a:avLst/>
@@ -3162,7 +2666,7 @@
               <a:rPr lang="en-US" smtClean="0"/>
               <a:t>Fifth level</a:t>
             </a:r>
-            <a:endParaRPr/>
+            <a:endParaRPr lang="en-US"/>
           </a:p>
         </p:txBody>
       </p:sp>
@@ -3178,7 +2682,7 @@
         </p:nvSpPr>
         <p:spPr>
           <a:xfrm>
-            <a:off x="5629835" y="6275668"/>
+            <a:off x="457200" y="6356350"/>
             <a:ext cx="2133600" cy="365125"/>
           </a:xfrm>
           <a:prstGeom prst="rect">
@@ -3188,10 +2692,12 @@
         <p:txBody>
           <a:bodyPr vert="horz" lIns="91440" tIns="45720" rIns="91440" bIns="45720" rtlCol="0" anchor="ctr"/>
           <a:lstStyle>
-            <a:lvl1pPr algn="r">
+            <a:lvl1pPr algn="l">
               <a:defRPr sz="1200">
                 <a:solidFill>
-                  <a:schemeClr val="bg1"/>
+                  <a:schemeClr val="tx1">
+                    <a:tint val="75000"/>
+                  </a:schemeClr>
                 </a:solidFill>
               </a:defRPr>
             </a:lvl1pPr>
@@ -3199,7 +2705,8 @@
           <a:p>
             <a:fld id="{C243C423-A908-1A4E-AAF6-CA2CF58F85BA}" type="datetimeFigureOut">
               <a:rPr lang="en-US" smtClean="0"/>
-              <a:t>10/18/15</a:t>
+              <a:pPr/>
+              <a:t>10/20/15</a:t>
             </a:fld>
             <a:endParaRPr lang="de-DE"/>
           </a:p>
@@ -3217,8 +2724,8 @@
         </p:nvSpPr>
         <p:spPr>
           <a:xfrm>
-            <a:off x="264458" y="6275668"/>
-            <a:ext cx="4840941" cy="365125"/>
+            <a:off x="3124200" y="6356350"/>
+            <a:ext cx="2895600" cy="365125"/>
           </a:xfrm>
           <a:prstGeom prst="rect">
             <a:avLst/>
@@ -3227,10 +2734,12 @@
         <p:txBody>
           <a:bodyPr vert="horz" lIns="91440" tIns="45720" rIns="91440" bIns="45720" rtlCol="0" anchor="ctr"/>
           <a:lstStyle>
-            <a:lvl1pPr algn="l">
+            <a:lvl1pPr algn="ctr">
               <a:defRPr sz="1200">
                 <a:solidFill>
-                  <a:schemeClr val="bg1"/>
+                  <a:schemeClr val="tx1">
+                    <a:tint val="75000"/>
+                  </a:schemeClr>
                 </a:solidFill>
               </a:defRPr>
             </a:lvl1pPr>
@@ -3252,8 +2761,8 @@
         </p:nvSpPr>
         <p:spPr>
           <a:xfrm>
-            <a:off x="7897906" y="6275668"/>
-            <a:ext cx="990600" cy="365125"/>
+            <a:off x="6553200" y="6356350"/>
+            <a:ext cx="2133600" cy="365125"/>
           </a:xfrm>
           <a:prstGeom prst="rect">
             <a:avLst/>
@@ -3263,9 +2772,11 @@
           <a:bodyPr vert="horz" lIns="91440" tIns="45720" rIns="91440" bIns="45720" rtlCol="0" anchor="ctr"/>
           <a:lstStyle>
             <a:lvl1pPr algn="r">
-              <a:defRPr sz="3600">
+              <a:defRPr sz="1200">
                 <a:solidFill>
-                  <a:schemeClr val="bg1"/>
+                  <a:schemeClr val="tx1">
+                    <a:tint val="75000"/>
+                  </a:schemeClr>
                 </a:solidFill>
               </a:defRPr>
             </a:lvl1pPr>
@@ -3273,6 +2784,7 @@
           <a:p>
             <a:fld id="{2E7E1A50-6DED-3042-A0E3-1B35F38C2747}" type="slidenum">
               <a:rPr lang="de-DE" smtClean="0"/>
+              <a:pPr/>
               <a:t>‹#›</a:t>
             </a:fld>
             <a:endParaRPr lang="de-DE"/>
@@ -3283,29 +2795,28 @@
   </p:cSld>
   <p:clrMap bg1="lt1" tx1="dk1" bg2="lt2" tx2="dk2" accent1="accent1" accent2="accent2" accent3="accent3" accent4="accent4" accent5="accent5" accent6="accent6" hlink="hlink" folHlink="folHlink"/>
   <p:sldLayoutIdLst>
-    <p:sldLayoutId id="2147483685" r:id="rId1"/>
-    <p:sldLayoutId id="2147483686" r:id="rId2"/>
-    <p:sldLayoutId id="2147483687" r:id="rId3"/>
-    <p:sldLayoutId id="2147483688" r:id="rId4"/>
-    <p:sldLayoutId id="2147483689" r:id="rId5"/>
-    <p:sldLayoutId id="2147483690" r:id="rId6"/>
-    <p:sldLayoutId id="2147483691" r:id="rId7"/>
-    <p:sldLayoutId id="2147483692" r:id="rId8"/>
-    <p:sldLayoutId id="2147483693" r:id="rId9"/>
-    <p:sldLayoutId id="2147483694" r:id="rId10"/>
-    <p:sldLayoutId id="2147483695" r:id="rId11"/>
-    <p:sldLayoutId id="2147483696" r:id="rId12"/>
+    <p:sldLayoutId id="2147483698" r:id="rId1"/>
+    <p:sldLayoutId id="2147483699" r:id="rId2"/>
+    <p:sldLayoutId id="2147483700" r:id="rId3"/>
+    <p:sldLayoutId id="2147483701" r:id="rId4"/>
+    <p:sldLayoutId id="2147483702" r:id="rId5"/>
+    <p:sldLayoutId id="2147483703" r:id="rId6"/>
+    <p:sldLayoutId id="2147483704" r:id="rId7"/>
+    <p:sldLayoutId id="2147483705" r:id="rId8"/>
+    <p:sldLayoutId id="2147483706" r:id="rId9"/>
+    <p:sldLayoutId id="2147483707" r:id="rId10"/>
+    <p:sldLayoutId id="2147483708" r:id="rId11"/>
   </p:sldLayoutIdLst>
   <p:txStyles>
     <p:titleStyle>
-      <a:lvl1pPr algn="ctr" defTabSz="914400" rtl="0" eaLnBrk="1" latinLnBrk="0" hangingPunct="1">
+      <a:lvl1pPr algn="ctr" defTabSz="457200" rtl="0" eaLnBrk="1" latinLnBrk="0" hangingPunct="1">
         <a:spcBef>
           <a:spcPct val="0"/>
         </a:spcBef>
         <a:buNone/>
-        <a:defRPr sz="4600" kern="1200">
+        <a:defRPr sz="4400" kern="1200">
           <a:solidFill>
-            <a:schemeClr val="accent1"/>
+            <a:schemeClr val="tx1"/>
           </a:solidFill>
           <a:latin typeface="+mj-lt"/>
           <a:ea typeface="+mj-ea"/>
@@ -3314,134 +2825,86 @@
       </a:lvl1pPr>
     </p:titleStyle>
     <p:bodyStyle>
-      <a:lvl1pPr marL="349250" indent="-349250" algn="l" defTabSz="914400" rtl="0" eaLnBrk="1" latinLnBrk="0" hangingPunct="1">
+      <a:lvl1pPr marL="342900" indent="-342900" algn="l" defTabSz="457200" rtl="0" eaLnBrk="1" latinLnBrk="0" hangingPunct="1">
         <a:spcBef>
-          <a:spcPts val="2000"/>
+          <a:spcPct val="20000"/>
         </a:spcBef>
-        <a:buClr>
-          <a:schemeClr val="accent1">
-            <a:lumMod val="60000"/>
-            <a:lumOff val="40000"/>
-          </a:schemeClr>
-        </a:buClr>
-        <a:buSzPct val="110000"/>
-        <a:buFont typeface="Wingdings 2" pitchFamily="18" charset="2"/>
-        <a:buChar char=""/>
-        <a:defRPr sz="2400" kern="1200">
+        <a:buFont typeface="Arial"/>
+        <a:buChar char="•"/>
+        <a:defRPr sz="3200" kern="1200">
           <a:solidFill>
-            <a:schemeClr val="tx1">
-              <a:lumMod val="65000"/>
-              <a:lumOff val="35000"/>
-            </a:schemeClr>
+            <a:schemeClr val="tx1"/>
           </a:solidFill>
           <a:latin typeface="+mn-lt"/>
           <a:ea typeface="+mn-ea"/>
           <a:cs typeface="+mn-cs"/>
         </a:defRPr>
       </a:lvl1pPr>
-      <a:lvl2pPr marL="685800" indent="-336550" algn="l" defTabSz="914400" rtl="0" eaLnBrk="1" latinLnBrk="0" hangingPunct="1">
+      <a:lvl2pPr marL="742950" indent="-285750" algn="l" defTabSz="457200" rtl="0" eaLnBrk="1" latinLnBrk="0" hangingPunct="1">
         <a:spcBef>
-          <a:spcPts val="600"/>
+          <a:spcPct val="20000"/>
         </a:spcBef>
-        <a:buClr>
-          <a:schemeClr val="accent1">
-            <a:lumMod val="75000"/>
-          </a:schemeClr>
-        </a:buClr>
-        <a:buSzPct val="110000"/>
-        <a:buFont typeface="Wingdings 2" pitchFamily="18" charset="2"/>
-        <a:buChar char=""/>
-        <a:defRPr sz="2200" kern="1200">
+        <a:buFont typeface="Arial"/>
+        <a:buChar char="–"/>
+        <a:defRPr sz="2800" kern="1200">
           <a:solidFill>
-            <a:schemeClr val="tx1">
-              <a:lumMod val="65000"/>
-              <a:lumOff val="35000"/>
-            </a:schemeClr>
+            <a:schemeClr val="tx1"/>
           </a:solidFill>
           <a:latin typeface="+mn-lt"/>
           <a:ea typeface="+mn-ea"/>
           <a:cs typeface="+mn-cs"/>
         </a:defRPr>
       </a:lvl2pPr>
-      <a:lvl3pPr marL="968375" indent="-282575" algn="l" defTabSz="914400" rtl="0" eaLnBrk="1" latinLnBrk="0" hangingPunct="1">
+      <a:lvl3pPr marL="1143000" indent="-228600" algn="l" defTabSz="457200" rtl="0" eaLnBrk="1" latinLnBrk="0" hangingPunct="1">
         <a:spcBef>
-          <a:spcPts val="600"/>
+          <a:spcPct val="20000"/>
         </a:spcBef>
-        <a:buClr>
-          <a:schemeClr val="accent1">
-            <a:lumMod val="60000"/>
-            <a:lumOff val="40000"/>
-          </a:schemeClr>
-        </a:buClr>
-        <a:buSzPct val="110000"/>
-        <a:buFont typeface="Wingdings 2" pitchFamily="18" charset="2"/>
-        <a:buChar char=""/>
-        <a:defRPr sz="2000" kern="1200">
+        <a:buFont typeface="Arial"/>
+        <a:buChar char="•"/>
+        <a:defRPr sz="2400" kern="1200">
           <a:solidFill>
-            <a:schemeClr val="tx1">
-              <a:lumMod val="65000"/>
-              <a:lumOff val="35000"/>
-            </a:schemeClr>
+            <a:schemeClr val="tx1"/>
           </a:solidFill>
           <a:latin typeface="+mn-lt"/>
           <a:ea typeface="+mn-ea"/>
           <a:cs typeface="+mn-cs"/>
         </a:defRPr>
       </a:lvl3pPr>
-      <a:lvl4pPr marL="1263650" indent="-295275" algn="l" defTabSz="914400" rtl="0" eaLnBrk="1" latinLnBrk="0" hangingPunct="1">
+      <a:lvl4pPr marL="1600200" indent="-228600" algn="l" defTabSz="457200" rtl="0" eaLnBrk="1" latinLnBrk="0" hangingPunct="1">
         <a:spcBef>
-          <a:spcPts val="600"/>
+          <a:spcPct val="20000"/>
         </a:spcBef>
-        <a:buClr>
-          <a:schemeClr val="accent1">
-            <a:lumMod val="75000"/>
-          </a:schemeClr>
-        </a:buClr>
-        <a:buSzPct val="110000"/>
-        <a:buFont typeface="Wingdings 2" pitchFamily="18" charset="2"/>
-        <a:buChar char=""/>
-        <a:defRPr sz="1800" kern="1200">
+        <a:buFont typeface="Arial"/>
+        <a:buChar char="–"/>
+        <a:defRPr sz="2000" kern="1200">
           <a:solidFill>
-            <a:schemeClr val="tx1">
-              <a:lumMod val="65000"/>
-              <a:lumOff val="35000"/>
-            </a:schemeClr>
+            <a:schemeClr val="tx1"/>
           </a:solidFill>
           <a:latin typeface="+mn-lt"/>
           <a:ea typeface="+mn-ea"/>
           <a:cs typeface="+mn-cs"/>
         </a:defRPr>
       </a:lvl4pPr>
-      <a:lvl5pPr marL="1546225" indent="-282575" algn="l" defTabSz="914400" rtl="0" eaLnBrk="1" latinLnBrk="0" hangingPunct="1">
+      <a:lvl5pPr marL="2057400" indent="-228600" algn="l" defTabSz="457200" rtl="0" eaLnBrk="1" latinLnBrk="0" hangingPunct="1">
         <a:spcBef>
-          <a:spcPts val="600"/>
+          <a:spcPct val="20000"/>
         </a:spcBef>
-        <a:buClr>
-          <a:schemeClr val="accent1">
-            <a:lumMod val="60000"/>
-            <a:lumOff val="40000"/>
-          </a:schemeClr>
-        </a:buClr>
-        <a:buSzPct val="110000"/>
-        <a:buFont typeface="Wingdings 2" pitchFamily="18" charset="2"/>
-        <a:buChar char=""/>
-        <a:defRPr sz="1800" kern="1200">
+        <a:buFont typeface="Arial"/>
+        <a:buChar char="»"/>
+        <a:defRPr sz="2000" kern="1200">
           <a:solidFill>
-            <a:schemeClr val="tx1">
-              <a:lumMod val="65000"/>
-              <a:lumOff val="35000"/>
-            </a:schemeClr>
+            <a:schemeClr val="tx1"/>
           </a:solidFill>
           <a:latin typeface="+mn-lt"/>
           <a:ea typeface="+mn-ea"/>
           <a:cs typeface="+mn-cs"/>
         </a:defRPr>
       </a:lvl5pPr>
-      <a:lvl6pPr marL="2514600" indent="-228600" algn="l" defTabSz="914400" rtl="0" eaLnBrk="1" latinLnBrk="0" hangingPunct="1">
+      <a:lvl6pPr marL="2514600" indent="-228600" algn="l" defTabSz="457200" rtl="0" eaLnBrk="1" latinLnBrk="0" hangingPunct="1">
         <a:spcBef>
           <a:spcPct val="20000"/>
         </a:spcBef>
-        <a:buFont typeface="Arial" pitchFamily="34" charset="0"/>
+        <a:buFont typeface="Arial"/>
         <a:buChar char="•"/>
         <a:defRPr sz="2000" kern="1200">
           <a:solidFill>
@@ -3452,11 +2915,11 @@
           <a:cs typeface="+mn-cs"/>
         </a:defRPr>
       </a:lvl6pPr>
-      <a:lvl7pPr marL="2971800" indent="-228600" algn="l" defTabSz="914400" rtl="0" eaLnBrk="1" latinLnBrk="0" hangingPunct="1">
+      <a:lvl7pPr marL="2971800" indent="-228600" algn="l" defTabSz="457200" rtl="0" eaLnBrk="1" latinLnBrk="0" hangingPunct="1">
         <a:spcBef>
           <a:spcPct val="20000"/>
         </a:spcBef>
-        <a:buFont typeface="Arial" pitchFamily="34" charset="0"/>
+        <a:buFont typeface="Arial"/>
         <a:buChar char="•"/>
         <a:defRPr sz="2000" kern="1200">
           <a:solidFill>
@@ -3467,11 +2930,11 @@
           <a:cs typeface="+mn-cs"/>
         </a:defRPr>
       </a:lvl7pPr>
-      <a:lvl8pPr marL="3429000" indent="-228600" algn="l" defTabSz="914400" rtl="0" eaLnBrk="1" latinLnBrk="0" hangingPunct="1">
+      <a:lvl8pPr marL="3429000" indent="-228600" algn="l" defTabSz="457200" rtl="0" eaLnBrk="1" latinLnBrk="0" hangingPunct="1">
         <a:spcBef>
           <a:spcPct val="20000"/>
         </a:spcBef>
-        <a:buFont typeface="Arial" pitchFamily="34" charset="0"/>
+        <a:buFont typeface="Arial"/>
         <a:buChar char="•"/>
         <a:defRPr sz="2000" kern="1200">
           <a:solidFill>
@@ -3482,11 +2945,11 @@
           <a:cs typeface="+mn-cs"/>
         </a:defRPr>
       </a:lvl8pPr>
-      <a:lvl9pPr marL="3886200" indent="-228600" algn="l" defTabSz="914400" rtl="0" eaLnBrk="1" latinLnBrk="0" hangingPunct="1">
+      <a:lvl9pPr marL="3886200" indent="-228600" algn="l" defTabSz="457200" rtl="0" eaLnBrk="1" latinLnBrk="0" hangingPunct="1">
         <a:spcBef>
           <a:spcPct val="20000"/>
         </a:spcBef>
-        <a:buFont typeface="Arial" pitchFamily="34" charset="0"/>
+        <a:buFont typeface="Arial"/>
         <a:buChar char="•"/>
         <a:defRPr sz="2000" kern="1200">
           <a:solidFill>
@@ -3500,9 +2963,9 @@
     </p:bodyStyle>
     <p:otherStyle>
       <a:defPPr>
-        <a:defRPr/>
+        <a:defRPr lang="en-US"/>
       </a:defPPr>
-      <a:lvl1pPr marL="0" algn="l" defTabSz="914400" rtl="0" eaLnBrk="1" latinLnBrk="0" hangingPunct="1">
+      <a:lvl1pPr marL="0" algn="l" defTabSz="457200" rtl="0" eaLnBrk="1" latinLnBrk="0" hangingPunct="1">
         <a:defRPr sz="1800" kern="1200">
           <a:solidFill>
             <a:schemeClr val="tx1"/>
@@ -3512,7 +2975,7 @@
           <a:cs typeface="+mn-cs"/>
         </a:defRPr>
       </a:lvl1pPr>
-      <a:lvl2pPr marL="457200" algn="l" defTabSz="914400" rtl="0" eaLnBrk="1" latinLnBrk="0" hangingPunct="1">
+      <a:lvl2pPr marL="457200" algn="l" defTabSz="457200" rtl="0" eaLnBrk="1" latinLnBrk="0" hangingPunct="1">
         <a:defRPr sz="1800" kern="1200">
           <a:solidFill>
             <a:schemeClr val="tx1"/>
@@ -3522,7 +2985,7 @@
           <a:cs typeface="+mn-cs"/>
         </a:defRPr>
       </a:lvl2pPr>
-      <a:lvl3pPr marL="914400" algn="l" defTabSz="914400" rtl="0" eaLnBrk="1" latinLnBrk="0" hangingPunct="1">
+      <a:lvl3pPr marL="914400" algn="l" defTabSz="457200" rtl="0" eaLnBrk="1" latinLnBrk="0" hangingPunct="1">
         <a:defRPr sz="1800" kern="1200">
           <a:solidFill>
             <a:schemeClr val="tx1"/>
@@ -3532,7 +2995,7 @@
           <a:cs typeface="+mn-cs"/>
         </a:defRPr>
       </a:lvl3pPr>
-      <a:lvl4pPr marL="1371600" algn="l" defTabSz="914400" rtl="0" eaLnBrk="1" latinLnBrk="0" hangingPunct="1">
+      <a:lvl4pPr marL="1371600" algn="l" defTabSz="457200" rtl="0" eaLnBrk="1" latinLnBrk="0" hangingPunct="1">
         <a:defRPr sz="1800" kern="1200">
           <a:solidFill>
             <a:schemeClr val="tx1"/>
@@ -3542,7 +3005,7 @@
           <a:cs typeface="+mn-cs"/>
         </a:defRPr>
       </a:lvl4pPr>
-      <a:lvl5pPr marL="1828800" algn="l" defTabSz="914400" rtl="0" eaLnBrk="1" latinLnBrk="0" hangingPunct="1">
+      <a:lvl5pPr marL="1828800" algn="l" defTabSz="457200" rtl="0" eaLnBrk="1" latinLnBrk="0" hangingPunct="1">
         <a:defRPr sz="1800" kern="1200">
           <a:solidFill>
             <a:schemeClr val="tx1"/>
@@ -3552,7 +3015,7 @@
           <a:cs typeface="+mn-cs"/>
         </a:defRPr>
       </a:lvl5pPr>
-      <a:lvl6pPr marL="2286000" algn="l" defTabSz="914400" rtl="0" eaLnBrk="1" latinLnBrk="0" hangingPunct="1">
+      <a:lvl6pPr marL="2286000" algn="l" defTabSz="457200" rtl="0" eaLnBrk="1" latinLnBrk="0" hangingPunct="1">
         <a:defRPr sz="1800" kern="1200">
           <a:solidFill>
             <a:schemeClr val="tx1"/>
@@ -3562,7 +3025,7 @@
           <a:cs typeface="+mn-cs"/>
         </a:defRPr>
       </a:lvl6pPr>
-      <a:lvl7pPr marL="2743200" algn="l" defTabSz="914400" rtl="0" eaLnBrk="1" latinLnBrk="0" hangingPunct="1">
+      <a:lvl7pPr marL="2743200" algn="l" defTabSz="457200" rtl="0" eaLnBrk="1" latinLnBrk="0" hangingPunct="1">
         <a:defRPr sz="1800" kern="1200">
           <a:solidFill>
             <a:schemeClr val="tx1"/>
@@ -3572,7 +3035,7 @@
           <a:cs typeface="+mn-cs"/>
         </a:defRPr>
       </a:lvl7pPr>
-      <a:lvl8pPr marL="3200400" algn="l" defTabSz="914400" rtl="0" eaLnBrk="1" latinLnBrk="0" hangingPunct="1">
+      <a:lvl8pPr marL="3200400" algn="l" defTabSz="457200" rtl="0" eaLnBrk="1" latinLnBrk="0" hangingPunct="1">
         <a:defRPr sz="1800" kern="1200">
           <a:solidFill>
             <a:schemeClr val="tx1"/>
@@ -3582,7 +3045,7 @@
           <a:cs typeface="+mn-cs"/>
         </a:defRPr>
       </a:lvl8pPr>
-      <a:lvl9pPr marL="3657600" algn="l" defTabSz="914400" rtl="0" eaLnBrk="1" latinLnBrk="0" hangingPunct="1">
+      <a:lvl9pPr marL="3657600" algn="l" defTabSz="457200" rtl="0" eaLnBrk="1" latinLnBrk="0" hangingPunct="1">
         <a:defRPr sz="1800" kern="1200">
           <a:solidFill>
             <a:schemeClr val="tx1"/>
@@ -3624,7 +3087,12 @@
             <p:ph type="ctrTitle"/>
           </p:nvPr>
         </p:nvSpPr>
-        <p:spPr/>
+        <p:spPr>
+          <a:xfrm>
+            <a:off x="685800" y="1215898"/>
+            <a:ext cx="7772400" cy="1470025"/>
+          </a:xfrm>
+        </p:spPr>
         <p:txBody>
           <a:bodyPr/>
           <a:lstStyle/>
@@ -3651,7 +3119,12 @@
             <p:ph type="subTitle" idx="1"/>
           </p:nvPr>
         </p:nvSpPr>
-        <p:spPr/>
+        <p:spPr>
+          <a:xfrm>
+            <a:off x="1371600" y="2685923"/>
+            <a:ext cx="6400800" cy="1752600"/>
+          </a:xfrm>
+        </p:spPr>
         <p:txBody>
           <a:bodyPr/>
           <a:lstStyle/>
@@ -3739,35 +3212,22 @@
             <p:ph type="title"/>
           </p:nvPr>
         </p:nvSpPr>
-        <p:spPr/>
-        <p:txBody>
-          <a:bodyPr/>
-          <a:lstStyle/>
-          <a:p>
+        <p:spPr>
+          <a:xfrm>
+            <a:off x="722313" y="2904644"/>
+            <a:ext cx="7772400" cy="1362075"/>
+          </a:xfrm>
+        </p:spPr>
+        <p:txBody>
+          <a:bodyPr/>
+          <a:lstStyle/>
+          <a:p>
+            <a:pPr algn="ctr"/>
             <a:r>
               <a:rPr lang="de-DE" dirty="0" smtClean="0"/>
               <a:t>In der Vorlesung</a:t>
             </a:r>
             <a:endParaRPr lang="de-DE" dirty="0"/>
-          </a:p>
-        </p:txBody>
-      </p:sp>
-      <p:sp>
-        <p:nvSpPr>
-          <p:cNvPr id="5" name="Text Placeholder 4"/>
-          <p:cNvSpPr>
-            <a:spLocks noGrp="1"/>
-          </p:cNvSpPr>
-          <p:nvPr>
-            <p:ph type="body" idx="1"/>
-          </p:nvPr>
-        </p:nvSpPr>
-        <p:spPr/>
-        <p:txBody>
-          <a:bodyPr/>
-          <a:lstStyle/>
-          <a:p>
-            <a:endParaRPr lang="de-DE"/>
           </a:p>
         </p:txBody>
       </p:sp>
@@ -3806,7 +3266,12 @@
             <p:ph type="title"/>
           </p:nvPr>
         </p:nvSpPr>
-        <p:spPr/>
+        <p:spPr>
+          <a:xfrm>
+            <a:off x="457200" y="409738"/>
+            <a:ext cx="8229600" cy="1143000"/>
+          </a:xfrm>
+        </p:spPr>
         <p:txBody>
           <a:bodyPr/>
           <a:lstStyle/>
@@ -3829,10 +3294,15 @@
             <p:ph idx="1"/>
           </p:nvPr>
         </p:nvSpPr>
-        <p:spPr/>
+        <p:spPr>
+          <a:xfrm>
+            <a:off x="770163" y="1417638"/>
+            <a:ext cx="7634076" cy="4350211"/>
+          </a:xfrm>
+        </p:spPr>
         <p:txBody>
           <a:bodyPr>
-            <a:normAutofit lnSpcReduction="10000"/>
+            <a:normAutofit fontScale="92500"/>
           </a:bodyPr>
           <a:lstStyle/>
           <a:p>
@@ -3842,31 +3312,16 @@
             </a:pPr>
             <a:r>
               <a:rPr lang="de-DE" dirty="0" smtClean="0"/>
-              <a:t>D</a:t>
+              <a:t>Das </a:t>
             </a:r>
             <a:r>
               <a:rPr lang="de-DE" dirty="0" smtClean="0"/>
-              <a:t>as </a:t>
+              <a:t>Arbeiten mit </a:t>
             </a:r>
             <a:r>
               <a:rPr lang="de-DE" dirty="0" smtClean="0"/>
-              <a:t>A</a:t>
-            </a:r>
-            <a:r>
-              <a:rPr lang="de-DE" dirty="0" smtClean="0"/>
-              <a:t>rbeiten mit einem Versionsmanagement Programms</a:t>
-            </a:r>
-          </a:p>
-          <a:p>
-            <a:pPr lvl="1">
-              <a:buFontTx/>
-              <a:buChar char="-"/>
-            </a:pPr>
-            <a:r>
-              <a:rPr lang="de-DE" dirty="0" err="1" smtClean="0"/>
-              <a:t>Git</a:t>
-            </a:r>
-            <a:endParaRPr lang="de-DE" dirty="0" smtClean="0"/>
+              <a:t>einem Versionsmanagement Programms</a:t>
+            </a:r>
           </a:p>
           <a:p>
             <a:pPr>
@@ -3875,7 +3330,7 @@
             </a:pPr>
             <a:r>
               <a:rPr lang="de-DE" dirty="0" smtClean="0"/>
-              <a:t>Einen strukturierten Verlauf des Entwickelns.</a:t>
+              <a:t>Strukturierten Verlauf des Entwickelns.</a:t>
             </a:r>
           </a:p>
           <a:p>
@@ -3885,7 +3340,19 @@
             </a:pPr>
             <a:r>
               <a:rPr lang="de-DE" dirty="0" smtClean="0"/>
-              <a:t>Die unterschiedliche Arten der Entwickelung eines Programms</a:t>
+              <a:t>U</a:t>
+            </a:r>
+            <a:r>
+              <a:rPr lang="de-DE" dirty="0" smtClean="0"/>
+              <a:t>nterschiedliche </a:t>
+            </a:r>
+            <a:r>
+              <a:rPr lang="de-DE" dirty="0" smtClean="0"/>
+              <a:t>Arten </a:t>
+            </a:r>
+            <a:r>
+              <a:rPr lang="de-DE" dirty="0" smtClean="0"/>
+              <a:t>der Programmentwickelung</a:t>
             </a:r>
           </a:p>
           <a:p>
@@ -3895,7 +3362,11 @@
             </a:pPr>
             <a:r>
               <a:rPr lang="de-DE" dirty="0" smtClean="0"/>
-              <a:t>Die Notwendigkeit von frühem Testen</a:t>
+              <a:t>Notwendigkeit </a:t>
+            </a:r>
+            <a:r>
+              <a:rPr lang="de-DE" dirty="0" smtClean="0"/>
+              <a:t>von frühem Testen</a:t>
             </a:r>
           </a:p>
           <a:p>
@@ -3946,7 +3417,12 @@
             <p:ph type="title"/>
           </p:nvPr>
         </p:nvSpPr>
-        <p:spPr/>
+        <p:spPr>
+          <a:xfrm>
+            <a:off x="457200" y="450268"/>
+            <a:ext cx="8229600" cy="1143000"/>
+          </a:xfrm>
+        </p:spPr>
         <p:txBody>
           <a:bodyPr/>
           <a:lstStyle/>
@@ -3969,7 +3445,12 @@
             <p:ph idx="1"/>
           </p:nvPr>
         </p:nvSpPr>
-        <p:spPr/>
+        <p:spPr>
+          <a:xfrm>
+            <a:off x="932303" y="1600200"/>
+            <a:ext cx="7228726" cy="4525963"/>
+          </a:xfrm>
+        </p:spPr>
         <p:txBody>
           <a:bodyPr/>
           <a:lstStyle/>
@@ -3980,21 +3461,11 @@
             </a:pPr>
             <a:r>
               <a:rPr lang="de-DE" dirty="0" smtClean="0"/>
-              <a:t>Test orientiertes Programmieren (TDD)</a:t>
-            </a:r>
-          </a:p>
-          <a:p>
-            <a:pPr lvl="1">
-              <a:buFontTx/>
-              <a:buChar char="-"/>
-            </a:pPr>
-            <a:r>
-              <a:rPr lang="de-DE" dirty="0" err="1" smtClean="0"/>
-              <a:t>JUnit</a:t>
+              <a:t>Test orientiertes Programmieren (TDD</a:t>
             </a:r>
             <a:r>
               <a:rPr lang="de-DE" dirty="0" smtClean="0"/>
-              <a:t> 4 </a:t>
+              <a:t>)</a:t>
             </a:r>
           </a:p>
           <a:p>
@@ -4004,7 +3475,11 @@
             </a:pPr>
             <a:r>
               <a:rPr lang="de-DE" dirty="0" err="1" smtClean="0"/>
-              <a:t>Pair-Programming</a:t>
+              <a:t>Pair</a:t>
+            </a:r>
+            <a:r>
+              <a:rPr lang="de-DE" dirty="0" err="1" smtClean="0"/>
+              <a:t>-Programming</a:t>
             </a:r>
             <a:endParaRPr lang="de-DE" dirty="0" smtClean="0"/>
           </a:p>
@@ -4104,34 +3579,21 @@
             <p:ph type="title"/>
           </p:nvPr>
         </p:nvSpPr>
-        <p:spPr/>
-        <p:txBody>
-          <a:bodyPr/>
-          <a:lstStyle/>
-          <a:p>
+        <p:spPr>
+          <a:xfrm>
+            <a:off x="722313" y="2866760"/>
+            <a:ext cx="7772400" cy="1362075"/>
+          </a:xfrm>
+        </p:spPr>
+        <p:txBody>
+          <a:bodyPr/>
+          <a:lstStyle/>
+          <a:p>
+            <a:pPr algn="ctr"/>
             <a:r>
               <a:rPr lang="de-DE" dirty="0" smtClean="0"/>
               <a:t>Im Projekt</a:t>
             </a:r>
-            <a:endParaRPr lang="de-DE" dirty="0"/>
-          </a:p>
-        </p:txBody>
-      </p:sp>
-      <p:sp>
-        <p:nvSpPr>
-          <p:cNvPr id="5" name="Text Placeholder 4"/>
-          <p:cNvSpPr>
-            <a:spLocks noGrp="1"/>
-          </p:cNvSpPr>
-          <p:nvPr>
-            <p:ph type="body" idx="1"/>
-          </p:nvPr>
-        </p:nvSpPr>
-        <p:spPr/>
-        <p:txBody>
-          <a:bodyPr/>
-          <a:lstStyle/>
-          <a:p>
             <a:endParaRPr lang="de-DE" dirty="0"/>
           </a:p>
         </p:txBody>
@@ -4171,9 +3633,16 @@
             <p:ph type="title"/>
           </p:nvPr>
         </p:nvSpPr>
-        <p:spPr/>
-        <p:txBody>
-          <a:bodyPr/>
+        <p:spPr>
+          <a:xfrm>
+            <a:off x="457200" y="544838"/>
+            <a:ext cx="8229600" cy="1143000"/>
+          </a:xfrm>
+        </p:spPr>
+        <p:txBody>
+          <a:bodyPr>
+            <a:normAutofit fontScale="90000"/>
+          </a:bodyPr>
           <a:lstStyle/>
           <a:p>
             <a:r>
@@ -4196,13 +3665,13 @@
         </p:nvSpPr>
         <p:spPr>
           <a:xfrm>
-            <a:off x="549275" y="1729277"/>
-            <a:ext cx="8042276" cy="4850080"/>
+            <a:off x="918791" y="1837356"/>
+            <a:ext cx="7215214" cy="3998953"/>
           </a:xfrm>
         </p:spPr>
         <p:txBody>
           <a:bodyPr>
-            <a:normAutofit/>
+            <a:normAutofit fontScale="85000" lnSpcReduction="10000"/>
           </a:bodyPr>
           <a:lstStyle/>
           <a:p>
@@ -4219,7 +3688,7 @@
             </a:r>
             <a:r>
               <a:rPr lang="de-DE" dirty="0" smtClean="0"/>
-              <a:t> zum Übertragen und Verwalten unser Datenklassen in eine relationale Datenbank</a:t>
+              <a:t> zur Datenbankverwaltung mit Java-Syntax</a:t>
             </a:r>
           </a:p>
           <a:p>
@@ -4228,7 +3697,11 @@
             </a:pPr>
             <a:r>
               <a:rPr lang="de-DE" dirty="0" smtClean="0"/>
-              <a:t>-	H2 die verwendete relationale Datenbank für die Persistenz der, vom Nutzer eingetragene, Information</a:t>
+              <a:t>-	</a:t>
+            </a:r>
+            <a:r>
+              <a:rPr lang="de-DE" dirty="0" smtClean="0"/>
+              <a:t>H2, relationale Datenbank,  für Persistenz</a:t>
             </a:r>
           </a:p>
           <a:p>
@@ -4251,7 +3724,11 @@
             </a:r>
             <a:r>
               <a:rPr lang="de-DE" dirty="0" smtClean="0"/>
-              <a:t> um die Benutzeroberfläche zu verwalten</a:t>
+              <a:t> um die Benutzeroberfläche zu </a:t>
+            </a:r>
+            <a:r>
+              <a:rPr lang="de-DE" dirty="0" smtClean="0"/>
+              <a:t>verwalten</a:t>
             </a:r>
           </a:p>
           <a:p>
@@ -4259,13 +3736,19 @@
               <a:buFontTx/>
               <a:buChar char="-"/>
             </a:pPr>
+            <a:r>
+              <a:rPr lang="de-DE" dirty="0" err="1" smtClean="0"/>
+              <a:t>Scenebuilder</a:t>
+            </a:r>
+            <a:r>
+              <a:rPr lang="de-DE" dirty="0" smtClean="0"/>
+              <a:t> zum vereinfachten Erstellung der </a:t>
+            </a:r>
+            <a:r>
+              <a:rPr lang="de-DE" dirty="0" smtClean="0"/>
+              <a:t>Benutzeroberfläche</a:t>
+            </a:r>
             <a:endParaRPr lang="de-DE" dirty="0" smtClean="0"/>
-          </a:p>
-          <a:p>
-            <a:pPr>
-              <a:buNone/>
-            </a:pPr>
-            <a:endParaRPr lang="de-DE" dirty="0"/>
           </a:p>
         </p:txBody>
       </p:sp>
@@ -4304,38 +3787,43 @@
             <p:ph type="title"/>
           </p:nvPr>
         </p:nvSpPr>
-        <p:spPr/>
-        <p:txBody>
-          <a:bodyPr/>
-          <a:lstStyle/>
-          <a:p>
-            <a:r>
-              <a:rPr lang="de-DE" dirty="0" smtClean="0"/>
-              <a:t>Neue Werkzeuge und Technologien</a:t>
-            </a:r>
-            <a:endParaRPr lang="de-DE" dirty="0"/>
-          </a:p>
-        </p:txBody>
-      </p:sp>
-      <p:sp>
-        <p:nvSpPr>
-          <p:cNvPr id="3" name="Content Placeholder 2"/>
-          <p:cNvSpPr>
-            <a:spLocks noGrp="1"/>
-          </p:cNvSpPr>
-          <p:nvPr>
-            <p:ph idx="1"/>
-          </p:nvPr>
-        </p:nvSpPr>
         <p:spPr>
           <a:xfrm>
-            <a:off x="549275" y="1444532"/>
-            <a:ext cx="8042276" cy="5134825"/>
+            <a:off x="457200" y="463778"/>
+            <a:ext cx="8229600" cy="1143000"/>
           </a:xfrm>
         </p:spPr>
         <p:txBody>
+          <a:bodyPr/>
+          <a:lstStyle/>
+          <a:p>
+            <a:r>
+              <a:rPr lang="de-DE" dirty="0" smtClean="0"/>
+              <a:t>Erfahrungen</a:t>
+            </a:r>
+            <a:endParaRPr lang="de-DE" dirty="0"/>
+          </a:p>
+        </p:txBody>
+      </p:sp>
+      <p:sp>
+        <p:nvSpPr>
+          <p:cNvPr id="3" name="Content Placeholder 2"/>
+          <p:cNvSpPr>
+            <a:spLocks noGrp="1"/>
+          </p:cNvSpPr>
+          <p:nvPr>
+            <p:ph idx="1"/>
+          </p:nvPr>
+        </p:nvSpPr>
+        <p:spPr>
+          <a:xfrm>
+            <a:off x="918791" y="1478611"/>
+            <a:ext cx="7417890" cy="4330678"/>
+          </a:xfrm>
+        </p:spPr>
+        <p:txBody>
           <a:bodyPr>
-            <a:normAutofit/>
+            <a:normAutofit fontScale="92500" lnSpcReduction="20000"/>
           </a:bodyPr>
           <a:lstStyle/>
           <a:p>
@@ -4344,20 +3832,16 @@
               <a:buChar char="-"/>
             </a:pPr>
             <a:r>
-              <a:rPr lang="de-DE" dirty="0" err="1" smtClean="0"/>
-              <a:t>Scenebuilder</a:t>
+              <a:rPr lang="de-DE" b="1" dirty="0" smtClean="0"/>
+              <a:t>Gute Stimmung </a:t>
             </a:r>
             <a:r>
               <a:rPr lang="de-DE" dirty="0" smtClean="0"/>
-              <a:t> </a:t>
-            </a:r>
-            <a:r>
-              <a:rPr lang="de-DE" dirty="0" smtClean="0"/>
-              <a:t>um das Erstellen der Benutzeroberfläche durch visuelle Elemente zu </a:t>
-            </a:r>
-            <a:r>
-              <a:rPr lang="de-DE" dirty="0" smtClean="0"/>
-              <a:t>vereinfachen</a:t>
+              <a:t>ist wichtig für </a:t>
+            </a:r>
+            <a:r>
+              <a:rPr lang="de-DE" b="1" dirty="0" smtClean="0"/>
+              <a:t>produktives Arbeiten</a:t>
             </a:r>
           </a:p>
           <a:p>
@@ -4367,23 +3851,7 @@
             </a:pPr>
             <a:r>
               <a:rPr lang="de-DE" dirty="0" smtClean="0"/>
-              <a:t>Code </a:t>
-            </a:r>
-            <a:r>
-              <a:rPr lang="de-DE" dirty="0" err="1" smtClean="0"/>
-              <a:t>Coverage</a:t>
-            </a:r>
-            <a:r>
-              <a:rPr lang="de-DE" dirty="0" smtClean="0"/>
-              <a:t> Tool, das die Test</a:t>
-            </a:r>
-            <a:r>
-              <a:rPr lang="de-DE" dirty="0" smtClean="0"/>
-              <a:t>ü</a:t>
-            </a:r>
-            <a:r>
-              <a:rPr lang="de-DE" dirty="0" smtClean="0"/>
-              <a:t>berdeckung übersichtlicher macht</a:t>
+              <a:t>Mehr kann geschafft werden als man erwartet, wenn man gut geplant arbeitet</a:t>
             </a:r>
           </a:p>
           <a:p>
@@ -4392,26 +3860,38 @@
               <a:buChar char="-"/>
             </a:pPr>
             <a:r>
-              <a:rPr lang="de-DE" dirty="0" err="1" smtClean="0"/>
-              <a:t>Db-Visualizer</a:t>
-            </a:r>
-            <a:r>
               <a:rPr lang="de-DE" dirty="0" smtClean="0"/>
-              <a:t> um die Datenbank einfacher zu überprüfen, mittels einer tabellarischen Darstellung</a:t>
-            </a:r>
+              <a:t>Prioritäten setzen</a:t>
+            </a:r>
+            <a:r>
+              <a:rPr lang="de-DE" dirty="0" smtClean="0"/>
+              <a:t> aber trotzdem flexibel sein.</a:t>
+            </a:r>
+            <a:endParaRPr lang="de-DE" dirty="0" smtClean="0"/>
           </a:p>
           <a:p>
             <a:pPr>
               <a:buFontTx/>
               <a:buChar char="-"/>
             </a:pPr>
-            <a:endParaRPr lang="de-DE" dirty="0" smtClean="0"/>
+            <a:r>
+              <a:rPr lang="de-DE" dirty="0" smtClean="0"/>
+              <a:t>Wissen wann etwas weniger wichtiges beiseite fallen muss</a:t>
+            </a:r>
           </a:p>
           <a:p>
             <a:pPr>
-              <a:buNone/>
+              <a:buFontTx/>
+              <a:buChar char="-"/>
             </a:pPr>
-            <a:endParaRPr lang="de-DE" dirty="0"/>
+            <a:r>
+              <a:rPr lang="de-DE" dirty="0" smtClean="0"/>
+              <a:t>Feedback vom Kunde ist </a:t>
+            </a:r>
+            <a:r>
+              <a:rPr lang="de-DE" b="1" dirty="0" smtClean="0"/>
+              <a:t>wertvoll</a:t>
+            </a:r>
           </a:p>
         </p:txBody>
       </p:sp>
@@ -4450,7 +3930,12 @@
             <p:ph type="title"/>
           </p:nvPr>
         </p:nvSpPr>
-        <p:spPr/>
+        <p:spPr>
+          <a:xfrm>
+            <a:off x="457200" y="409738"/>
+            <a:ext cx="8229600" cy="1143000"/>
+          </a:xfrm>
+        </p:spPr>
         <p:txBody>
           <a:bodyPr/>
           <a:lstStyle/>
@@ -4473,7 +3958,12 @@
             <p:ph idx="1"/>
           </p:nvPr>
         </p:nvSpPr>
-        <p:spPr/>
+        <p:spPr>
+          <a:xfrm>
+            <a:off x="918791" y="1424571"/>
+            <a:ext cx="7417890" cy="4317168"/>
+          </a:xfrm>
+        </p:spPr>
         <p:txBody>
           <a:bodyPr>
             <a:normAutofit/>
@@ -4486,129 +3976,8 @@
             </a:pPr>
             <a:r>
               <a:rPr lang="de-DE" dirty="0" smtClean="0"/>
-              <a:t>Gute Stimmung ist wichtig für produktives Arbeiten</a:t>
-            </a:r>
-          </a:p>
-          <a:p>
-            <a:pPr>
-              <a:buFontTx/>
-              <a:buChar char="-"/>
-            </a:pPr>
-            <a:r>
-              <a:rPr lang="de-DE" dirty="0" smtClean="0"/>
-              <a:t>Mehr kann geschafft werden als man erwartet, wenn man gut geplant arbeitet</a:t>
-            </a:r>
-          </a:p>
-          <a:p>
-            <a:pPr>
-              <a:buFontTx/>
-              <a:buChar char="-"/>
-            </a:pPr>
-            <a:r>
-              <a:rPr lang="de-DE" dirty="0" smtClean="0"/>
-              <a:t>Prioritäten setzen und diesen folgen.</a:t>
-            </a:r>
-          </a:p>
-          <a:p>
-            <a:pPr>
-              <a:buFontTx/>
-              <a:buChar char="-"/>
-            </a:pPr>
-            <a:r>
-              <a:rPr lang="de-DE" dirty="0" smtClean="0"/>
-              <a:t>Wissen wann etwas weniger wichtiges beiseite fallen muss</a:t>
-            </a:r>
-          </a:p>
-          <a:p>
-            <a:pPr>
-              <a:buFontTx/>
-              <a:buChar char="-"/>
-            </a:pPr>
-            <a:r>
-              <a:rPr lang="de-DE" dirty="0" smtClean="0"/>
-              <a:t>Feedback vom Kunde ist wertvoll</a:t>
-            </a:r>
-          </a:p>
-        </p:txBody>
-      </p:sp>
-    </p:spTree>
-  </p:cSld>
-  <p:clrMapOvr>
-    <a:masterClrMapping/>
-  </p:clrMapOvr>
-</p:sld>
-</file>
-
-<file path=ppt/slides/slide9.xml><?xml version="1.0" encoding="utf-8"?>
-<p:sld xmlns:a="http://schemas.openxmlformats.org/drawingml/2006/main" xmlns:r="http://schemas.openxmlformats.org/officeDocument/2006/relationships" xmlns:mc="http://schemas.openxmlformats.org/markup-compatibility/2006" xmlns:mv="urn:schemas-microsoft-com:mac:vml" xmlns:p="http://schemas.openxmlformats.org/presentationml/2006/main" mc:Ignorable="mv" mc:PreserveAttributes="mv:*">
-  <p:cSld>
-    <p:spTree>
-      <p:nvGrpSpPr>
-        <p:cNvPr id="1" name=""/>
-        <p:cNvGrpSpPr/>
-        <p:nvPr/>
-      </p:nvGrpSpPr>
-      <p:grpSpPr>
-        <a:xfrm>
-          <a:off x="0" y="0"/>
-          <a:ext cx="0" cy="0"/>
-          <a:chOff x="0" y="0"/>
-          <a:chExt cx="0" cy="0"/>
-        </a:xfrm>
-      </p:grpSpPr>
-      <p:sp>
-        <p:nvSpPr>
-          <p:cNvPr id="2" name="Title 1"/>
-          <p:cNvSpPr>
-            <a:spLocks noGrp="1"/>
-          </p:cNvSpPr>
-          <p:nvPr>
-            <p:ph type="title"/>
-          </p:nvPr>
-        </p:nvSpPr>
-        <p:spPr/>
-        <p:txBody>
-          <a:bodyPr/>
-          <a:lstStyle/>
-          <a:p>
-            <a:r>
-              <a:rPr lang="de-DE" dirty="0" smtClean="0"/>
-              <a:t>Erfahrungen</a:t>
-            </a:r>
-            <a:endParaRPr lang="de-DE" dirty="0"/>
-          </a:p>
-        </p:txBody>
-      </p:sp>
-      <p:sp>
-        <p:nvSpPr>
-          <p:cNvPr id="3" name="Content Placeholder 2"/>
-          <p:cNvSpPr>
-            <a:spLocks noGrp="1"/>
-          </p:cNvSpPr>
-          <p:nvPr>
-            <p:ph idx="1"/>
-          </p:nvPr>
-        </p:nvSpPr>
-        <p:spPr/>
-        <p:txBody>
-          <a:bodyPr>
-            <a:normAutofit/>
-          </a:bodyPr>
-          <a:lstStyle/>
-          <a:p>
-            <a:pPr>
-              <a:buFontTx/>
-              <a:buChar char="-"/>
-            </a:pPr>
-            <a:r>
-              <a:rPr lang="de-DE" dirty="0" smtClean="0"/>
-              <a:t>Arbeiten an einem Programm mit der selben Gruppe von </a:t>
-            </a:r>
-            <a:r>
-              <a:rPr lang="de-DE" smtClean="0"/>
-              <a:t>Personen über eine größere Zeitspanne.</a:t>
-            </a:r>
-            <a:endParaRPr lang="de-DE" dirty="0" smtClean="0"/>
+              <a:t>Arbeiten an einem Programm mit der selben Gruppe von Personen über eine größere Zeitspanne.</a:t>
+            </a:r>
           </a:p>
           <a:p>
             <a:pPr>
@@ -4641,113 +4010,170 @@
 </file>
 
 <file path=ppt/theme/theme1.xml><?xml version="1.0" encoding="utf-8"?>
-<a:theme xmlns:a="http://schemas.openxmlformats.org/drawingml/2006/main" name="Breeze">
+<a:theme xmlns:a="http://schemas.openxmlformats.org/drawingml/2006/main" name="scroll-background">
   <a:themeElements>
-    <a:clrScheme name="Breeze">
+    <a:clrScheme name="Custom 1">
       <a:dk1>
-        <a:sysClr val="windowText" lastClr="000000"/>
+        <a:srgbClr val="000000"/>
       </a:dk1>
       <a:lt1>
         <a:sysClr val="window" lastClr="FFFFFF"/>
       </a:lt1>
       <a:dk2>
-        <a:srgbClr val="09213B"/>
+        <a:srgbClr val="339966"/>
       </a:dk2>
       <a:lt2>
-        <a:srgbClr val="D5EDF4"/>
+        <a:srgbClr val="FCFBF4"/>
       </a:lt2>
       <a:accent1>
-        <a:srgbClr val="2C7C9F"/>
+        <a:srgbClr val="4F81BD"/>
       </a:accent1>
       <a:accent2>
-        <a:srgbClr val="244A58"/>
+        <a:srgbClr val="C0504D"/>
       </a:accent2>
       <a:accent3>
-        <a:srgbClr val="E2751D"/>
+        <a:srgbClr val="9BBB59"/>
       </a:accent3>
       <a:accent4>
-        <a:srgbClr val="FFB400"/>
+        <a:srgbClr val="8064A2"/>
       </a:accent4>
       <a:accent5>
-        <a:srgbClr val="7EB606"/>
+        <a:srgbClr val="4BACC6"/>
       </a:accent5>
       <a:accent6>
-        <a:srgbClr val="C00000"/>
+        <a:srgbClr val="F79646"/>
       </a:accent6>
       <a:hlink>
-        <a:srgbClr val="7030A0"/>
+        <a:srgbClr val="0000FF"/>
       </a:hlink>
       <a:folHlink>
-        <a:srgbClr val="00B0F0"/>
+        <a:srgbClr val="800080"/>
       </a:folHlink>
     </a:clrScheme>
-    <a:fontScheme name="Breeze">
+    <a:fontScheme name="Foundry">
       <a:majorFont>
-        <a:latin typeface="News Gothic MT"/>
+        <a:latin typeface="Rockwell"/>
         <a:ea typeface=""/>
         <a:cs typeface=""/>
-        <a:font script="Jpan" typeface="ＭＳ Ｐゴシック"/>
+        <a:font script="Grek" typeface="Cambria"/>
+        <a:font script="Cyrl" typeface="Cambria"/>
+        <a:font script="Jpan" typeface="ＭＳ 明朝"/>
+        <a:font script="Hang" typeface="바탕"/>
+        <a:font script="Hans" typeface="方正姚体"/>
+        <a:font script="Hant" typeface="微軟正黑體"/>
+        <a:font script="Arab" typeface="Times New Roman"/>
+        <a:font script="Hebr" typeface="David"/>
+        <a:font script="Thai" typeface="JasmineUPC"/>
+        <a:font script="Ethi" typeface="Nyala"/>
+        <a:font script="Beng" typeface="Vrinda"/>
+        <a:font script="Gujr" typeface="Shruti"/>
+        <a:font script="Khmr" typeface="MoolBoran"/>
+        <a:font script="Knda" typeface="Tunga"/>
+        <a:font script="Guru" typeface="Raavi"/>
+        <a:font script="Cans" typeface="Euphemia"/>
+        <a:font script="Cher" typeface="Plantagenet Cherokee"/>
+        <a:font script="Yiii" typeface="Microsoft Yi Baiti"/>
+        <a:font script="Tibt" typeface="Microsoft Himalaya"/>
+        <a:font script="Thaa" typeface="MV Boli"/>
+        <a:font script="Deva" typeface="Mangal"/>
+        <a:font script="Telu" typeface="Gautami"/>
+        <a:font script="Taml" typeface="Latha"/>
+        <a:font script="Syrc" typeface="Estrangelo Edessa"/>
+        <a:font script="Orya" typeface="Kalinga"/>
+        <a:font script="Mlym" typeface="Kartika"/>
+        <a:font script="Laoo" typeface="DokChampa"/>
+        <a:font script="Sinh" typeface="Iskoola Pota"/>
+        <a:font script="Mong" typeface="Mongolian Baiti"/>
+        <a:font script="Viet" typeface="Arial"/>
+        <a:font script="Uigh" typeface="Microsoft Uighur"/>
       </a:majorFont>
       <a:minorFont>
-        <a:latin typeface="News Gothic MT"/>
+        <a:latin typeface="Rockwell"/>
         <a:ea typeface=""/>
         <a:cs typeface=""/>
-        <a:font script="Jpan" typeface="ＭＳ Ｐゴシック"/>
+        <a:font script="Grek" typeface="Cambria"/>
+        <a:font script="Cyrl" typeface="Cambria"/>
+        <a:font script="Jpan" typeface="ＭＳ 明朝"/>
+        <a:font script="Hang" typeface="바탕"/>
+        <a:font script="Hans" typeface="方正姚体"/>
+        <a:font script="Hant" typeface="標楷體"/>
+        <a:font script="Arab" typeface="Times New Roman"/>
+        <a:font script="Hebr" typeface="David"/>
+        <a:font script="Thai" typeface="JasmineUPC"/>
+        <a:font script="Ethi" typeface="Nyala"/>
+        <a:font script="Beng" typeface="Vrinda"/>
+        <a:font script="Gujr" typeface="Shruti"/>
+        <a:font script="Khmr" typeface="MoolBoran"/>
+        <a:font script="Knda" typeface="Tunga"/>
+        <a:font script="Guru" typeface="Raavi"/>
+        <a:font script="Cans" typeface="Euphemia"/>
+        <a:font script="Cher" typeface="Plantagenet Cherokee"/>
+        <a:font script="Yiii" typeface="Microsoft Yi Baiti"/>
+        <a:font script="Tibt" typeface="Microsoft Himalaya"/>
+        <a:font script="Thaa" typeface="MV Boli"/>
+        <a:font script="Deva" typeface="Mangal"/>
+        <a:font script="Telu" typeface="Gautami"/>
+        <a:font script="Taml" typeface="Latha"/>
+        <a:font script="Syrc" typeface="Estrangelo Edessa"/>
+        <a:font script="Orya" typeface="Kalinga"/>
+        <a:font script="Mlym" typeface="Kartika"/>
+        <a:font script="Laoo" typeface="DokChampa"/>
+        <a:font script="Sinh" typeface="Iskoola Pota"/>
+        <a:font script="Mong" typeface="Mongolian Baiti"/>
+        <a:font script="Viet" typeface="Times New Roman"/>
+        <a:font script="Uigh" typeface="Microsoft Uighur"/>
       </a:minorFont>
     </a:fontScheme>
-    <a:fmtScheme name="Breeze">
+    <a:fmtScheme name="Office">
       <a:fillStyleLst>
         <a:solidFill>
           <a:schemeClr val="phClr"/>
         </a:solidFill>
         <a:gradFill rotWithShape="1">
           <a:gsLst>
-            <a:gs pos="31000">
+            <a:gs pos="0">
               <a:schemeClr val="phClr">
-                <a:tint val="100000"/>
-                <a:shade val="100000"/>
-                <a:satMod val="120000"/>
+                <a:tint val="50000"/>
+                <a:satMod val="300000"/>
+              </a:schemeClr>
+            </a:gs>
+            <a:gs pos="35000">
+              <a:schemeClr val="phClr">
+                <a:tint val="37000"/>
+                <a:satMod val="300000"/>
               </a:schemeClr>
             </a:gs>
             <a:gs pos="100000">
               <a:schemeClr val="phClr">
-                <a:tint val="50000"/>
-                <a:satMod val="150000"/>
+                <a:tint val="15000"/>
+                <a:satMod val="350000"/>
               </a:schemeClr>
             </a:gs>
           </a:gsLst>
-          <a:lin ang="5400000" scaled="1"/>
+          <a:lin ang="16200000" scaled="1"/>
         </a:gradFill>
         <a:gradFill rotWithShape="1">
           <a:gsLst>
             <a:gs pos="0">
               <a:schemeClr val="phClr">
+                <a:tint val="100000"/>
                 <a:shade val="100000"/>
-                <a:satMod val="120000"/>
-              </a:schemeClr>
-            </a:gs>
-            <a:gs pos="69000">
-              <a:schemeClr val="phClr">
-                <a:tint val="80000"/>
-                <a:shade val="100000"/>
-                <a:satMod val="150000"/>
+                <a:satMod val="130000"/>
               </a:schemeClr>
             </a:gs>
             <a:gs pos="100000">
               <a:schemeClr val="phClr">
                 <a:tint val="50000"/>
                 <a:shade val="100000"/>
-                <a:satMod val="150000"/>
+                <a:satMod val="350000"/>
               </a:schemeClr>
             </a:gs>
           </a:gsLst>
-          <a:path path="circle">
-            <a:fillToRect l="100000" t="100000" r="100000" b="100000"/>
-          </a:path>
+          <a:lin ang="16200000" scaled="0"/>
         </a:gradFill>
       </a:fillStyleLst>
       <a:lnStyleLst>
-        <a:ln w="12700" cap="flat" cmpd="sng" algn="ctr">
+        <a:ln w="9525" cap="flat" cmpd="sng" algn="ctr">
           <a:solidFill>
             <a:schemeClr val="phClr">
               <a:shade val="95000"/>
@@ -4756,13 +4182,13 @@
           </a:solidFill>
           <a:prstDash val="solid"/>
         </a:ln>
-        <a:ln w="25400" cap="flat" cmpd="dbl" algn="ctr">
+        <a:ln w="25400" cap="flat" cmpd="sng" algn="ctr">
           <a:solidFill>
             <a:schemeClr val="phClr"/>
           </a:solidFill>
           <a:prstDash val="solid"/>
         </a:ln>
-        <a:ln w="31750" cap="flat" cmpd="dbl" algn="ctr">
+        <a:ln w="38100" cap="flat" cmpd="sng" algn="ctr">
           <a:solidFill>
             <a:schemeClr val="phClr"/>
           </a:solidFill>
@@ -4771,38 +4197,41 @@
       </a:lnStyleLst>
       <a:effectStyleLst>
         <a:effectStyle>
-          <a:effectLst/>
-        </a:effectStyle>
-        <a:effectStyle>
           <a:effectLst>
-            <a:outerShdw blurRad="63500" dist="25400" dir="5400000" sx="101000" sy="101000" rotWithShape="0">
+            <a:outerShdw blurRad="40000" dist="20000" dir="5400000" rotWithShape="0">
               <a:srgbClr val="000000">
-                <a:alpha val="40000"/>
+                <a:alpha val="38000"/>
               </a:srgbClr>
             </a:outerShdw>
           </a:effectLst>
         </a:effectStyle>
         <a:effectStyle>
           <a:effectLst>
-            <a:innerShdw blurRad="127000" dist="25400" dir="13500000">
-              <a:srgbClr val="C0C0C0">
-                <a:alpha val="75000"/>
+            <a:outerShdw blurRad="40000" dist="23000" dir="5400000" rotWithShape="0">
+              <a:srgbClr val="000000">
+                <a:alpha val="35000"/>
               </a:srgbClr>
-            </a:innerShdw>
-            <a:outerShdw blurRad="88900" dist="25400" dir="5400000" sx="102000" sy="102000" algn="ctr" rotWithShape="0">
-              <a:srgbClr val="C0C0C0">
-                <a:alpha val="40000"/>
+            </a:outerShdw>
+          </a:effectLst>
+        </a:effectStyle>
+        <a:effectStyle>
+          <a:effectLst>
+            <a:outerShdw blurRad="40000" dist="23000" dir="5400000" rotWithShape="0">
+              <a:srgbClr val="000000">
+                <a:alpha val="35000"/>
               </a:srgbClr>
             </a:outerShdw>
           </a:effectLst>
           <a:scene3d>
-            <a:camera prst="perspectiveLeft" fov="300000"/>
-            <a:lightRig rig="soft" dir="l">
-              <a:rot lat="0" lon="0" rev="4200000"/>
+            <a:camera prst="orthographicFront">
+              <a:rot lat="0" lon="0" rev="0"/>
+            </a:camera>
+            <a:lightRig rig="threePt" dir="t">
+              <a:rot lat="0" lon="0" rev="1200000"/>
             </a:lightRig>
           </a:scene3d>
-          <a:sp3d extrusionH="38100" prstMaterial="powder">
-            <a:bevelT w="50800" h="88900" prst="convex"/>
+          <a:sp3d>
+            <a:bevelT w="63500" h="25400"/>
           </a:sp3d>
         </a:effectStyle>
       </a:effectStyleLst>
@@ -4836,33 +4265,33 @@
             <a:fillToRect l="50000" t="-80000" r="50000" b="180000"/>
           </a:path>
         </a:gradFill>
-        <a:blipFill rotWithShape="1">
-          <a:blip xmlns:r="http://schemas.openxmlformats.org/officeDocument/2006/relationships" r:embed="rId1">
-            <a:duotone>
+        <a:gradFill rotWithShape="1">
+          <a:gsLst>
+            <a:gs pos="0">
               <a:schemeClr val="phClr">
-                <a:shade val="40000"/>
-                <a:satMod val="400000"/>
+                <a:tint val="80000"/>
+                <a:satMod val="300000"/>
               </a:schemeClr>
+            </a:gs>
+            <a:gs pos="100000">
               <a:schemeClr val="phClr">
-                <a:tint val="10000"/>
+                <a:shade val="30000"/>
                 <a:satMod val="200000"/>
               </a:schemeClr>
-            </a:duotone>
-          </a:blip>
-          <a:stretch/>
-        </a:blipFill>
+            </a:gs>
+          </a:gsLst>
+          <a:path path="circle">
+            <a:fillToRect l="50000" t="50000" r="50000" b="50000"/>
+          </a:path>
+        </a:gradFill>
       </a:bgFillStyleLst>
     </a:fmtScheme>
   </a:themeElements>
   <a:objectDefaults>
     <a:spDef>
       <a:spPr/>
-      <a:bodyPr rtlCol="0" anchor="ctr"/>
-      <a:lstStyle>
-        <a:defPPr algn="ctr">
-          <a:defRPr/>
-        </a:defPPr>
-      </a:lstStyle>
+      <a:bodyPr/>
+      <a:lstStyle/>
       <a:style>
         <a:lnRef idx="1">
           <a:schemeClr val="accent1"/>

</xml_diff>